<commit_message>
replotted figures after code correction
</commit_message>
<xml_diff>
--- a/Presentations+Papers/AW_fin.pptx
+++ b/Presentations+Papers/AW_fin.pptx
@@ -11,7 +11,9 @@
     <p:sldId id="267" r:id="rId5"/>
     <p:sldId id="268" r:id="rId6"/>
     <p:sldId id="269" r:id="rId7"/>
-    <p:sldId id="261" r:id="rId8"/>
+    <p:sldId id="271" r:id="rId8"/>
+    <p:sldId id="270" r:id="rId9"/>
+    <p:sldId id="261" r:id="rId10"/>
   </p:sldIdLst>
   <p:sldSz cx="12192000" cy="6858000"/>
   <p:notesSz cx="6858000" cy="9144000"/>
@@ -265,7 +267,7 @@
           <a:p>
             <a:fld id="{F60B097C-15D3-4C10-907C-9D6BDD5AB733}" type="datetimeFigureOut">
               <a:rPr lang="en-US" smtClean="0"/>
-              <a:t>5/18/2019</a:t>
+              <a:t>5/20/2019</a:t>
             </a:fld>
             <a:endParaRPr lang="en-US"/>
           </a:p>
@@ -463,7 +465,7 @@
           <a:p>
             <a:fld id="{F60B097C-15D3-4C10-907C-9D6BDD5AB733}" type="datetimeFigureOut">
               <a:rPr lang="en-US" smtClean="0"/>
-              <a:t>5/18/2019</a:t>
+              <a:t>5/20/2019</a:t>
             </a:fld>
             <a:endParaRPr lang="en-US"/>
           </a:p>
@@ -671,7 +673,7 @@
           <a:p>
             <a:fld id="{F60B097C-15D3-4C10-907C-9D6BDD5AB733}" type="datetimeFigureOut">
               <a:rPr lang="en-US" smtClean="0"/>
-              <a:t>5/18/2019</a:t>
+              <a:t>5/20/2019</a:t>
             </a:fld>
             <a:endParaRPr lang="en-US"/>
           </a:p>
@@ -869,7 +871,7 @@
           <a:p>
             <a:fld id="{F60B097C-15D3-4C10-907C-9D6BDD5AB733}" type="datetimeFigureOut">
               <a:rPr lang="en-US" smtClean="0"/>
-              <a:t>5/18/2019</a:t>
+              <a:t>5/20/2019</a:t>
             </a:fld>
             <a:endParaRPr lang="en-US"/>
           </a:p>
@@ -1144,7 +1146,7 @@
           <a:p>
             <a:fld id="{F60B097C-15D3-4C10-907C-9D6BDD5AB733}" type="datetimeFigureOut">
               <a:rPr lang="en-US" smtClean="0"/>
-              <a:t>5/18/2019</a:t>
+              <a:t>5/20/2019</a:t>
             </a:fld>
             <a:endParaRPr lang="en-US"/>
           </a:p>
@@ -1409,7 +1411,7 @@
           <a:p>
             <a:fld id="{F60B097C-15D3-4C10-907C-9D6BDD5AB733}" type="datetimeFigureOut">
               <a:rPr lang="en-US" smtClean="0"/>
-              <a:t>5/18/2019</a:t>
+              <a:t>5/20/2019</a:t>
             </a:fld>
             <a:endParaRPr lang="en-US"/>
           </a:p>
@@ -1821,7 +1823,7 @@
           <a:p>
             <a:fld id="{F60B097C-15D3-4C10-907C-9D6BDD5AB733}" type="datetimeFigureOut">
               <a:rPr lang="en-US" smtClean="0"/>
-              <a:t>5/18/2019</a:t>
+              <a:t>5/20/2019</a:t>
             </a:fld>
             <a:endParaRPr lang="en-US"/>
           </a:p>
@@ -1962,7 +1964,7 @@
           <a:p>
             <a:fld id="{F60B097C-15D3-4C10-907C-9D6BDD5AB733}" type="datetimeFigureOut">
               <a:rPr lang="en-US" smtClean="0"/>
-              <a:t>5/18/2019</a:t>
+              <a:t>5/20/2019</a:t>
             </a:fld>
             <a:endParaRPr lang="en-US"/>
           </a:p>
@@ -2075,7 +2077,7 @@
           <a:p>
             <a:fld id="{F60B097C-15D3-4C10-907C-9D6BDD5AB733}" type="datetimeFigureOut">
               <a:rPr lang="en-US" smtClean="0"/>
-              <a:t>5/18/2019</a:t>
+              <a:t>5/20/2019</a:t>
             </a:fld>
             <a:endParaRPr lang="en-US"/>
           </a:p>
@@ -2386,7 +2388,7 @@
           <a:p>
             <a:fld id="{F60B097C-15D3-4C10-907C-9D6BDD5AB733}" type="datetimeFigureOut">
               <a:rPr lang="en-US" smtClean="0"/>
-              <a:t>5/18/2019</a:t>
+              <a:t>5/20/2019</a:t>
             </a:fld>
             <a:endParaRPr lang="en-US"/>
           </a:p>
@@ -2674,7 +2676,7 @@
           <a:p>
             <a:fld id="{F60B097C-15D3-4C10-907C-9D6BDD5AB733}" type="datetimeFigureOut">
               <a:rPr lang="en-US" smtClean="0"/>
-              <a:t>5/18/2019</a:t>
+              <a:t>5/20/2019</a:t>
             </a:fld>
             <a:endParaRPr lang="en-US"/>
           </a:p>
@@ -2915,7 +2917,7 @@
           <a:p>
             <a:fld id="{F60B097C-15D3-4C10-907C-9D6BDD5AB733}" type="datetimeFigureOut">
               <a:rPr lang="en-US" smtClean="0"/>
-              <a:t>5/18/2019</a:t>
+              <a:t>5/20/2019</a:t>
             </a:fld>
             <a:endParaRPr lang="en-US"/>
           </a:p>
@@ -3402,10 +3404,7 @@
             <a:br>
               <a:rPr lang="en-US" dirty="0"/>
             </a:br>
-            <a:r>
-              <a:rPr lang="en-US" dirty="0"/>
-              <a:t>Department of Integrative Biology, Oregon State University</a:t>
-            </a:r>
+            <a:endParaRPr lang="en-US" dirty="0"/>
           </a:p>
         </p:txBody>
       </p:sp>
@@ -7884,8 +7883,8 @@
           </p:sp>
         </mc:Fallback>
       </mc:AlternateContent>
-      <mc:AlternateContent xmlns:mc="http://schemas.openxmlformats.org/markup-compatibility/2006">
-        <mc:Choice xmlns:a14="http://schemas.microsoft.com/office/drawing/2010/main" Requires="a14">
+      <mc:AlternateContent xmlns:mc="http://schemas.openxmlformats.org/markup-compatibility/2006" xmlns:a14="http://schemas.microsoft.com/office/drawing/2010/main">
+        <mc:Choice Requires="a14">
           <p:sp>
             <p:nvSpPr>
               <p:cNvPr id="165" name="TextBox 164">
@@ -8101,7 +8100,7 @@
             </p:txBody>
           </p:sp>
         </mc:Choice>
-        <mc:Fallback>
+        <mc:Fallback xmlns="">
           <p:sp>
             <p:nvSpPr>
               <p:cNvPr id="165" name="TextBox 164">
@@ -8146,8 +8145,8 @@
           </p:sp>
         </mc:Fallback>
       </mc:AlternateContent>
-      <mc:AlternateContent xmlns:mc="http://schemas.openxmlformats.org/markup-compatibility/2006">
-        <mc:Choice xmlns:a14="http://schemas.microsoft.com/office/drawing/2010/main" Requires="a14">
+      <mc:AlternateContent xmlns:mc="http://schemas.openxmlformats.org/markup-compatibility/2006" xmlns:a14="http://schemas.microsoft.com/office/drawing/2010/main">
+        <mc:Choice Requires="a14">
           <p:sp>
             <p:nvSpPr>
               <p:cNvPr id="166" name="TextBox 165">
@@ -8469,7 +8468,7 @@
             </p:txBody>
           </p:sp>
         </mc:Choice>
-        <mc:Fallback>
+        <mc:Fallback xmlns="">
           <p:sp>
             <p:nvSpPr>
               <p:cNvPr id="166" name="TextBox 165">
@@ -8546,8 +8545,8 @@
           </a:p>
         </p:txBody>
       </p:sp>
-      <mc:AlternateContent xmlns:mc="http://schemas.openxmlformats.org/markup-compatibility/2006">
-        <mc:Choice xmlns:a14="http://schemas.microsoft.com/office/drawing/2010/main" Requires="a14">
+      <mc:AlternateContent xmlns:mc="http://schemas.openxmlformats.org/markup-compatibility/2006" xmlns:a14="http://schemas.microsoft.com/office/drawing/2010/main">
+        <mc:Choice Requires="a14">
           <p:sp>
             <p:nvSpPr>
               <p:cNvPr id="168" name="TextBox 167">
@@ -8817,7 +8816,7 @@
             </p:txBody>
           </p:sp>
         </mc:Choice>
-        <mc:Fallback>
+        <mc:Fallback xmlns="">
           <p:sp>
             <p:nvSpPr>
               <p:cNvPr id="168" name="TextBox 167">
@@ -8862,8 +8861,8 @@
           </p:sp>
         </mc:Fallback>
       </mc:AlternateContent>
-      <mc:AlternateContent xmlns:mc="http://schemas.openxmlformats.org/markup-compatibility/2006">
-        <mc:Choice xmlns:a14="http://schemas.microsoft.com/office/drawing/2010/main" Requires="a14">
+      <mc:AlternateContent xmlns:mc="http://schemas.openxmlformats.org/markup-compatibility/2006" xmlns:a14="http://schemas.microsoft.com/office/drawing/2010/main">
+        <mc:Choice Requires="a14">
           <p:sp>
             <p:nvSpPr>
               <p:cNvPr id="169" name="TextBox 168">
@@ -9128,7 +9127,7 @@
             </p:txBody>
           </p:sp>
         </mc:Choice>
-        <mc:Fallback>
+        <mc:Fallback xmlns="">
           <p:sp>
             <p:nvSpPr>
               <p:cNvPr id="169" name="TextBox 168">
@@ -9264,8 +9263,8 @@
           </a:p>
         </p:txBody>
       </p:sp>
-      <mc:AlternateContent xmlns:mc="http://schemas.openxmlformats.org/markup-compatibility/2006">
-        <mc:Choice xmlns:a14="http://schemas.microsoft.com/office/drawing/2010/main" Requires="a14">
+      <mc:AlternateContent xmlns:mc="http://schemas.openxmlformats.org/markup-compatibility/2006" xmlns:a14="http://schemas.microsoft.com/office/drawing/2010/main">
+        <mc:Choice Requires="a14">
           <p:sp>
             <p:nvSpPr>
               <p:cNvPr id="10" name="TextBox 9">
@@ -9530,7 +9529,7 @@
             </p:txBody>
           </p:sp>
         </mc:Choice>
-        <mc:Fallback>
+        <mc:Fallback xmlns="">
           <p:sp>
             <p:nvSpPr>
               <p:cNvPr id="10" name="TextBox 9">
@@ -9575,8 +9574,8 @@
           </p:sp>
         </mc:Fallback>
       </mc:AlternateContent>
-      <mc:AlternateContent xmlns:mc="http://schemas.openxmlformats.org/markup-compatibility/2006">
-        <mc:Choice xmlns:a14="http://schemas.microsoft.com/office/drawing/2010/main" Requires="a14">
+      <mc:AlternateContent xmlns:mc="http://schemas.openxmlformats.org/markup-compatibility/2006" xmlns:a14="http://schemas.microsoft.com/office/drawing/2010/main">
+        <mc:Choice Requires="a14">
           <p:sp>
             <p:nvSpPr>
               <p:cNvPr id="11" name="TextBox 10">
@@ -9676,7 +9675,7 @@
             </p:txBody>
           </p:sp>
         </mc:Choice>
-        <mc:Fallback>
+        <mc:Fallback xmlns="">
           <p:sp>
             <p:nvSpPr>
               <p:cNvPr id="11" name="TextBox 10">
@@ -9721,8 +9720,8 @@
           </p:sp>
         </mc:Fallback>
       </mc:AlternateContent>
-      <mc:AlternateContent xmlns:mc="http://schemas.openxmlformats.org/markup-compatibility/2006">
-        <mc:Choice xmlns:a14="http://schemas.microsoft.com/office/drawing/2010/main" Requires="a14">
+      <mc:AlternateContent xmlns:mc="http://schemas.openxmlformats.org/markup-compatibility/2006" xmlns:a14="http://schemas.microsoft.com/office/drawing/2010/main">
+        <mc:Choice Requires="a14">
           <p:sp>
             <p:nvSpPr>
               <p:cNvPr id="12" name="TextBox 11">
@@ -9938,7 +9937,7 @@
             </p:txBody>
           </p:sp>
         </mc:Choice>
-        <mc:Fallback>
+        <mc:Fallback xmlns="">
           <p:sp>
             <p:nvSpPr>
               <p:cNvPr id="12" name="TextBox 11">
@@ -9983,8 +9982,8 @@
           </p:sp>
         </mc:Fallback>
       </mc:AlternateContent>
-      <mc:AlternateContent xmlns:mc="http://schemas.openxmlformats.org/markup-compatibility/2006">
-        <mc:Choice xmlns:a14="http://schemas.microsoft.com/office/drawing/2010/main" Requires="a14">
+      <mc:AlternateContent xmlns:mc="http://schemas.openxmlformats.org/markup-compatibility/2006" xmlns:a14="http://schemas.microsoft.com/office/drawing/2010/main">
+        <mc:Choice Requires="a14">
           <p:sp>
             <p:nvSpPr>
               <p:cNvPr id="14" name="TextBox 13">
@@ -10254,7 +10253,7 @@
             </p:txBody>
           </p:sp>
         </mc:Choice>
-        <mc:Fallback>
+        <mc:Fallback xmlns="">
           <p:sp>
             <p:nvSpPr>
               <p:cNvPr id="14" name="TextBox 13">
@@ -10299,8 +10298,8 @@
           </p:sp>
         </mc:Fallback>
       </mc:AlternateContent>
-      <mc:AlternateContent xmlns:mc="http://schemas.openxmlformats.org/markup-compatibility/2006">
-        <mc:Choice xmlns:a14="http://schemas.microsoft.com/office/drawing/2010/main" Requires="a14">
+      <mc:AlternateContent xmlns:mc="http://schemas.openxmlformats.org/markup-compatibility/2006" xmlns:a14="http://schemas.microsoft.com/office/drawing/2010/main">
+        <mc:Choice Requires="a14">
           <p:sp>
             <p:nvSpPr>
               <p:cNvPr id="23" name="TextBox 22">
@@ -10342,6 +10341,7 @@
                 </a:r>
               </a:p>
               <a:p>
+                <a:pPr/>
                 <a14:m>
                   <m:oMathPara xmlns:m="http://schemas.openxmlformats.org/officeDocument/2006/math">
                     <m:oMathParaPr>
@@ -10555,7 +10555,7 @@
             </p:txBody>
           </p:sp>
         </mc:Choice>
-        <mc:Fallback>
+        <mc:Fallback xmlns="">
           <p:sp>
             <p:nvSpPr>
               <p:cNvPr id="23" name="TextBox 22">
@@ -10607,10 +10607,10 @@
       </mc:AlternateContent>
       <p:pic>
         <p:nvPicPr>
-          <p:cNvPr id="25" name="Picture 24" descr="A close up of a mans face&#10;&#10;Description generated with very high confidence">
+          <p:cNvPr id="4" name="Picture 3" descr="A close up of a mans face&#10;&#10;Description generated with high confidence">
             <a:extLst>
               <a:ext uri="{FF2B5EF4-FFF2-40B4-BE49-F238E27FC236}">
-                <a16:creationId xmlns:a16="http://schemas.microsoft.com/office/drawing/2014/main" id="{171ABFBD-4D37-42CD-82B5-EC8166EFDC8E}"/>
+                <a16:creationId xmlns:a16="http://schemas.microsoft.com/office/drawing/2014/main" id="{4C1EFC52-5AF5-46AB-BAA0-258427618765}"/>
               </a:ext>
             </a:extLst>
           </p:cNvPr>
@@ -10633,7 +10633,7 @@
         </p:blipFill>
         <p:spPr>
           <a:xfrm>
-            <a:off x="5504201" y="1027906"/>
+            <a:off x="5257800" y="962553"/>
             <a:ext cx="6096000" cy="4572000"/>
           </a:xfrm>
           <a:prstGeom prst="rect">
@@ -10704,8 +10704,8 @@
           </a:p>
         </p:txBody>
       </p:sp>
-      <mc:AlternateContent xmlns:mc="http://schemas.openxmlformats.org/markup-compatibility/2006">
-        <mc:Choice xmlns:a14="http://schemas.microsoft.com/office/drawing/2010/main" Requires="a14">
+      <mc:AlternateContent xmlns:mc="http://schemas.openxmlformats.org/markup-compatibility/2006" xmlns:a14="http://schemas.microsoft.com/office/drawing/2010/main">
+        <mc:Choice Requires="a14">
           <p:sp>
             <p:nvSpPr>
               <p:cNvPr id="23" name="TextBox 22">
@@ -10747,6 +10747,7 @@
                 </a:r>
               </a:p>
               <a:p>
+                <a:pPr/>
                 <a14:m>
                   <m:oMathPara xmlns:m="http://schemas.openxmlformats.org/officeDocument/2006/math">
                     <m:oMathParaPr>
@@ -10960,7 +10961,7 @@
             </p:txBody>
           </p:sp>
         </mc:Choice>
-        <mc:Fallback>
+        <mc:Fallback xmlns="">
           <p:sp>
             <p:nvSpPr>
               <p:cNvPr id="23" name="TextBox 22">
@@ -11010,8 +11011,8 @@
           </p:sp>
         </mc:Fallback>
       </mc:AlternateContent>
-      <mc:AlternateContent xmlns:mc="http://schemas.openxmlformats.org/markup-compatibility/2006">
-        <mc:Choice xmlns:a14="http://schemas.microsoft.com/office/drawing/2010/main" Requires="a14">
+      <mc:AlternateContent xmlns:mc="http://schemas.openxmlformats.org/markup-compatibility/2006" xmlns:a14="http://schemas.microsoft.com/office/drawing/2010/main">
+        <mc:Choice Requires="a14">
           <p:sp>
             <p:nvSpPr>
               <p:cNvPr id="9" name="TextBox 8">
@@ -11276,7 +11277,7 @@
             </p:txBody>
           </p:sp>
         </mc:Choice>
-        <mc:Fallback>
+        <mc:Fallback xmlns="">
           <p:sp>
             <p:nvSpPr>
               <p:cNvPr id="9" name="TextBox 8">
@@ -11321,8 +11322,8 @@
           </p:sp>
         </mc:Fallback>
       </mc:AlternateContent>
-      <mc:AlternateContent xmlns:mc="http://schemas.openxmlformats.org/markup-compatibility/2006">
-        <mc:Choice xmlns:a14="http://schemas.microsoft.com/office/drawing/2010/main" Requires="a14">
+      <mc:AlternateContent xmlns:mc="http://schemas.openxmlformats.org/markup-compatibility/2006" xmlns:a14="http://schemas.microsoft.com/office/drawing/2010/main">
+        <mc:Choice Requires="a14">
           <p:sp>
             <p:nvSpPr>
               <p:cNvPr id="13" name="TextBox 12">
@@ -11422,7 +11423,7 @@
             </p:txBody>
           </p:sp>
         </mc:Choice>
-        <mc:Fallback>
+        <mc:Fallback xmlns="">
           <p:sp>
             <p:nvSpPr>
               <p:cNvPr id="13" name="TextBox 12">
@@ -11467,8 +11468,8 @@
           </p:sp>
         </mc:Fallback>
       </mc:AlternateContent>
-      <mc:AlternateContent xmlns:mc="http://schemas.openxmlformats.org/markup-compatibility/2006">
-        <mc:Choice xmlns:a14="http://schemas.microsoft.com/office/drawing/2010/main" Requires="a14">
+      <mc:AlternateContent xmlns:mc="http://schemas.openxmlformats.org/markup-compatibility/2006" xmlns:a14="http://schemas.microsoft.com/office/drawing/2010/main">
+        <mc:Choice Requires="a14">
           <p:sp>
             <p:nvSpPr>
               <p:cNvPr id="15" name="TextBox 14">
@@ -11556,16 +11557,7 @@
                           </a:solidFill>
                           <a:latin typeface="Cambria Math" panose="02040503050406030204" pitchFamily="18" charset="0"/>
                         </a:rPr>
-                        <m:t>→0</m:t>
-                      </m:r>
-                      <m:r>
-                        <a:rPr lang="en-US" b="0" i="1" smtClean="0">
-                          <a:solidFill>
-                            <a:schemeClr val="tx1"/>
-                          </a:solidFill>
-                          <a:latin typeface="Cambria Math" panose="02040503050406030204" pitchFamily="18" charset="0"/>
-                        </a:rPr>
-                        <m:t> </m:t>
+                        <m:t>→0 </m:t>
                       </m:r>
                     </m:oMath>
                   </m:oMathPara>
@@ -11575,7 +11567,7 @@
             </p:txBody>
           </p:sp>
         </mc:Choice>
-        <mc:Fallback>
+        <mc:Fallback xmlns="">
           <p:sp>
             <p:nvSpPr>
               <p:cNvPr id="15" name="TextBox 14">
@@ -11620,8 +11612,8 @@
           </p:sp>
         </mc:Fallback>
       </mc:AlternateContent>
-      <mc:AlternateContent xmlns:mc="http://schemas.openxmlformats.org/markup-compatibility/2006">
-        <mc:Choice xmlns:a14="http://schemas.microsoft.com/office/drawing/2010/main" Requires="a14">
+      <mc:AlternateContent xmlns:mc="http://schemas.openxmlformats.org/markup-compatibility/2006" xmlns:a14="http://schemas.microsoft.com/office/drawing/2010/main">
+        <mc:Choice Requires="a14">
           <p:sp>
             <p:nvSpPr>
               <p:cNvPr id="18" name="TextBox 17">
@@ -11834,7 +11826,7 @@
             </p:txBody>
           </p:sp>
         </mc:Choice>
-        <mc:Fallback>
+        <mc:Fallback xmlns="">
           <p:sp>
             <p:nvSpPr>
               <p:cNvPr id="18" name="TextBox 17">
@@ -11978,8 +11970,8 @@
           </a:p>
         </p:txBody>
       </p:sp>
-      <mc:AlternateContent xmlns:mc="http://schemas.openxmlformats.org/markup-compatibility/2006">
-        <mc:Choice xmlns:a14="http://schemas.microsoft.com/office/drawing/2010/main" Requires="a14">
+      <mc:AlternateContent xmlns:mc="http://schemas.openxmlformats.org/markup-compatibility/2006" xmlns:a14="http://schemas.microsoft.com/office/drawing/2010/main">
+        <mc:Choice Requires="a14">
           <p:sp>
             <p:nvSpPr>
               <p:cNvPr id="23" name="TextBox 22">
@@ -12021,6 +12013,7 @@
                 </a:r>
               </a:p>
               <a:p>
+                <a:pPr/>
                 <a14:m>
                   <m:oMathPara xmlns:m="http://schemas.openxmlformats.org/officeDocument/2006/math">
                     <m:oMathParaPr>
@@ -12263,7 +12256,7 @@
             </p:txBody>
           </p:sp>
         </mc:Choice>
-        <mc:Fallback>
+        <mc:Fallback xmlns="">
           <p:sp>
             <p:nvSpPr>
               <p:cNvPr id="23" name="TextBox 22">
@@ -12313,8 +12306,8 @@
           </p:sp>
         </mc:Fallback>
       </mc:AlternateContent>
-      <mc:AlternateContent xmlns:mc="http://schemas.openxmlformats.org/markup-compatibility/2006">
-        <mc:Choice xmlns:a14="http://schemas.microsoft.com/office/drawing/2010/main" Requires="a14">
+      <mc:AlternateContent xmlns:mc="http://schemas.openxmlformats.org/markup-compatibility/2006" xmlns:a14="http://schemas.microsoft.com/office/drawing/2010/main">
+        <mc:Choice Requires="a14">
           <p:sp>
             <p:nvSpPr>
               <p:cNvPr id="10" name="TextBox 9">
@@ -12579,7 +12572,7 @@
             </p:txBody>
           </p:sp>
         </mc:Choice>
-        <mc:Fallback>
+        <mc:Fallback xmlns="">
           <p:sp>
             <p:nvSpPr>
               <p:cNvPr id="10" name="TextBox 9">
@@ -12624,8 +12617,8 @@
           </p:sp>
         </mc:Fallback>
       </mc:AlternateContent>
-      <mc:AlternateContent xmlns:mc="http://schemas.openxmlformats.org/markup-compatibility/2006">
-        <mc:Choice xmlns:a14="http://schemas.microsoft.com/office/drawing/2010/main" Requires="a14">
+      <mc:AlternateContent xmlns:mc="http://schemas.openxmlformats.org/markup-compatibility/2006" xmlns:a14="http://schemas.microsoft.com/office/drawing/2010/main">
+        <mc:Choice Requires="a14">
           <p:sp>
             <p:nvSpPr>
               <p:cNvPr id="11" name="TextBox 10">
@@ -12834,7 +12827,7 @@
             </p:txBody>
           </p:sp>
         </mc:Choice>
-        <mc:Fallback>
+        <mc:Fallback xmlns="">
           <p:sp>
             <p:nvSpPr>
               <p:cNvPr id="11" name="TextBox 10">
@@ -12879,8 +12872,8 @@
           </p:sp>
         </mc:Fallback>
       </mc:AlternateContent>
-      <mc:AlternateContent xmlns:mc="http://schemas.openxmlformats.org/markup-compatibility/2006">
-        <mc:Choice xmlns:a14="http://schemas.microsoft.com/office/drawing/2010/main" Requires="a14">
+      <mc:AlternateContent xmlns:mc="http://schemas.openxmlformats.org/markup-compatibility/2006" xmlns:a14="http://schemas.microsoft.com/office/drawing/2010/main">
+        <mc:Choice Requires="a14">
           <p:sp>
             <p:nvSpPr>
               <p:cNvPr id="12" name="TextBox 11">
@@ -12968,16 +12961,7 @@
                           </a:solidFill>
                           <a:latin typeface="Cambria Math" panose="02040503050406030204" pitchFamily="18" charset="0"/>
                         </a:rPr>
-                        <m:t>→0</m:t>
-                      </m:r>
-                      <m:r>
-                        <a:rPr lang="en-US" b="0" i="1" smtClean="0">
-                          <a:solidFill>
-                            <a:schemeClr val="tx1"/>
-                          </a:solidFill>
-                          <a:latin typeface="Cambria Math" panose="02040503050406030204" pitchFamily="18" charset="0"/>
-                        </a:rPr>
-                        <m:t> </m:t>
+                        <m:t>→0 </m:t>
                       </m:r>
                     </m:oMath>
                   </m:oMathPara>
@@ -12987,7 +12971,7 @@
             </p:txBody>
           </p:sp>
         </mc:Choice>
-        <mc:Fallback>
+        <mc:Fallback xmlns="">
           <p:sp>
             <p:nvSpPr>
               <p:cNvPr id="12" name="TextBox 11">
@@ -13032,8 +13016,8 @@
           </p:sp>
         </mc:Fallback>
       </mc:AlternateContent>
-      <mc:AlternateContent xmlns:mc="http://schemas.openxmlformats.org/markup-compatibility/2006">
-        <mc:Choice xmlns:a14="http://schemas.microsoft.com/office/drawing/2010/main" Requires="a14">
+      <mc:AlternateContent xmlns:mc="http://schemas.openxmlformats.org/markup-compatibility/2006" xmlns:a14="http://schemas.microsoft.com/office/drawing/2010/main">
+        <mc:Choice Requires="a14">
           <p:sp>
             <p:nvSpPr>
               <p:cNvPr id="14" name="TextBox 13">
@@ -13303,7 +13287,7 @@
             </p:txBody>
           </p:sp>
         </mc:Choice>
-        <mc:Fallback>
+        <mc:Fallback xmlns="">
           <p:sp>
             <p:nvSpPr>
               <p:cNvPr id="14" name="TextBox 13">
@@ -13350,10 +13334,10 @@
       </mc:AlternateContent>
       <p:pic>
         <p:nvPicPr>
-          <p:cNvPr id="7" name="Picture 6" descr="A close up of a logo&#10;&#10;Description generated with high confidence">
+          <p:cNvPr id="4" name="Picture 3" descr="A screenshot of a social media post&#10;&#10;Description generated with very high confidence">
             <a:extLst>
               <a:ext uri="{FF2B5EF4-FFF2-40B4-BE49-F238E27FC236}">
-                <a16:creationId xmlns:a16="http://schemas.microsoft.com/office/drawing/2014/main" id="{D2A6FBE9-756E-40CF-B6D5-BDFFB03A53CA}"/>
+                <a16:creationId xmlns:a16="http://schemas.microsoft.com/office/drawing/2014/main" id="{5E20B42A-3ECD-4A0D-914F-5E07C3418116}"/>
               </a:ext>
             </a:extLst>
           </p:cNvPr>
@@ -13376,8 +13360,8 @@
         </p:blipFill>
         <p:spPr>
           <a:xfrm>
-            <a:off x="6410957" y="3429000"/>
-            <a:ext cx="4183262" cy="3137447"/>
+            <a:off x="6239652" y="191193"/>
+            <a:ext cx="4317076" cy="3237807"/>
           </a:xfrm>
           <a:prstGeom prst="rect">
             <a:avLst/>
@@ -13391,10 +13375,10 @@
       </p:pic>
       <p:pic>
         <p:nvPicPr>
-          <p:cNvPr id="19" name="Picture 18" descr="A screenshot of a social media post&#10;&#10;Description generated with very high confidence">
+          <p:cNvPr id="6" name="Picture 5" descr="A screenshot of a cell phone&#10;&#10;Description generated with high confidence">
             <a:extLst>
               <a:ext uri="{FF2B5EF4-FFF2-40B4-BE49-F238E27FC236}">
-                <a16:creationId xmlns:a16="http://schemas.microsoft.com/office/drawing/2014/main" id="{D67A7BE4-FDBF-4CD1-842F-C6B398E69E83}"/>
+                <a16:creationId xmlns:a16="http://schemas.microsoft.com/office/drawing/2014/main" id="{CE9F9941-EB66-4130-A4CF-F7F797AE8BE3}"/>
               </a:ext>
             </a:extLst>
           </p:cNvPr>
@@ -13417,8 +13401,49 @@
         </p:blipFill>
         <p:spPr>
           <a:xfrm>
-            <a:off x="6410956" y="160714"/>
-            <a:ext cx="4186033" cy="3139525"/>
+            <a:off x="4180737" y="3597026"/>
+            <a:ext cx="3682948" cy="2762211"/>
+          </a:xfrm>
+          <a:prstGeom prst="rect">
+            <a:avLst/>
+          </a:prstGeom>
+          <a:ln>
+            <a:solidFill>
+              <a:schemeClr val="tx1"/>
+            </a:solidFill>
+          </a:ln>
+        </p:spPr>
+      </p:pic>
+      <p:pic>
+        <p:nvPicPr>
+          <p:cNvPr id="9" name="Picture 8" descr="A screenshot of a cell phone&#10;&#10;Description generated with very high confidence">
+            <a:extLst>
+              <a:ext uri="{FF2B5EF4-FFF2-40B4-BE49-F238E27FC236}">
+                <a16:creationId xmlns:a16="http://schemas.microsoft.com/office/drawing/2014/main" id="{7A75103B-1673-43A1-B35B-67B620149E21}"/>
+              </a:ext>
+            </a:extLst>
+          </p:cNvPr>
+          <p:cNvPicPr>
+            <a:picLocks noChangeAspect="1"/>
+          </p:cNvPicPr>
+          <p:nvPr/>
+        </p:nvPicPr>
+        <p:blipFill>
+          <a:blip r:embed="rId9">
+            <a:extLst>
+              <a:ext uri="{28A0092B-C50C-407E-A947-70E740481C1C}">
+                <a14:useLocalDpi xmlns:a14="http://schemas.microsoft.com/office/drawing/2010/main" val="0"/>
+              </a:ext>
+            </a:extLst>
+          </a:blip>
+          <a:stretch>
+            <a:fillRect/>
+          </a:stretch>
+        </p:blipFill>
+        <p:spPr>
+          <a:xfrm>
+            <a:off x="8146472" y="3597026"/>
+            <a:ext cx="3682948" cy="2762211"/>
           </a:xfrm>
           <a:prstGeom prst="rect">
             <a:avLst/>
@@ -13493,8 +13518,8 @@
           </a:p>
         </p:txBody>
       </p:sp>
-      <mc:AlternateContent xmlns:mc="http://schemas.openxmlformats.org/markup-compatibility/2006">
-        <mc:Choice xmlns:a14="http://schemas.microsoft.com/office/drawing/2010/main" Requires="a14">
+      <mc:AlternateContent xmlns:mc="http://schemas.openxmlformats.org/markup-compatibility/2006" xmlns:a14="http://schemas.microsoft.com/office/drawing/2010/main">
+        <mc:Choice Requires="a14">
           <p:sp>
             <p:nvSpPr>
               <p:cNvPr id="13" name="TextBox 12">
@@ -13802,7 +13827,7 @@
             </p:txBody>
           </p:sp>
         </mc:Choice>
-        <mc:Fallback>
+        <mc:Fallback xmlns="">
           <p:sp>
             <p:nvSpPr>
               <p:cNvPr id="13" name="TextBox 12">
@@ -13847,8 +13872,8 @@
           </p:sp>
         </mc:Fallback>
       </mc:AlternateContent>
-      <mc:AlternateContent xmlns:mc="http://schemas.openxmlformats.org/markup-compatibility/2006">
-        <mc:Choice xmlns:a14="http://schemas.microsoft.com/office/drawing/2010/main" Requires="a14">
+      <mc:AlternateContent xmlns:mc="http://schemas.openxmlformats.org/markup-compatibility/2006" xmlns:a14="http://schemas.microsoft.com/office/drawing/2010/main">
+        <mc:Choice Requires="a14">
           <p:sp>
             <p:nvSpPr>
               <p:cNvPr id="15" name="TextBox 14">
@@ -13948,7 +13973,7 @@
             </p:txBody>
           </p:sp>
         </mc:Choice>
-        <mc:Fallback>
+        <mc:Fallback xmlns="">
           <p:sp>
             <p:nvSpPr>
               <p:cNvPr id="15" name="TextBox 14">
@@ -13993,8 +14018,8 @@
           </p:sp>
         </mc:Fallback>
       </mc:AlternateContent>
-      <mc:AlternateContent xmlns:mc="http://schemas.openxmlformats.org/markup-compatibility/2006">
-        <mc:Choice xmlns:a14="http://schemas.microsoft.com/office/drawing/2010/main" Requires="a14">
+      <mc:AlternateContent xmlns:mc="http://schemas.openxmlformats.org/markup-compatibility/2006" xmlns:a14="http://schemas.microsoft.com/office/drawing/2010/main">
+        <mc:Choice Requires="a14">
           <p:sp>
             <p:nvSpPr>
               <p:cNvPr id="16" name="TextBox 15">
@@ -14210,7 +14235,7 @@
             </p:txBody>
           </p:sp>
         </mc:Choice>
-        <mc:Fallback>
+        <mc:Fallback xmlns="">
           <p:sp>
             <p:nvSpPr>
               <p:cNvPr id="16" name="TextBox 15">
@@ -14255,8 +14280,8 @@
           </p:sp>
         </mc:Fallback>
       </mc:AlternateContent>
-      <mc:AlternateContent xmlns:mc="http://schemas.openxmlformats.org/markup-compatibility/2006">
-        <mc:Choice xmlns:a14="http://schemas.microsoft.com/office/drawing/2010/main" Requires="a14">
+      <mc:AlternateContent xmlns:mc="http://schemas.openxmlformats.org/markup-compatibility/2006" xmlns:a14="http://schemas.microsoft.com/office/drawing/2010/main">
+        <mc:Choice Requires="a14">
           <p:sp>
             <p:nvSpPr>
               <p:cNvPr id="18" name="TextBox 17">
@@ -14526,7 +14551,7 @@
             </p:txBody>
           </p:sp>
         </mc:Choice>
-        <mc:Fallback>
+        <mc:Fallback xmlns="">
           <p:sp>
             <p:nvSpPr>
               <p:cNvPr id="18" name="TextBox 17">
@@ -14571,8 +14596,8 @@
           </p:sp>
         </mc:Fallback>
       </mc:AlternateContent>
-      <mc:AlternateContent xmlns:mc="http://schemas.openxmlformats.org/markup-compatibility/2006">
-        <mc:Choice xmlns:a14="http://schemas.microsoft.com/office/drawing/2010/main" Requires="a14">
+      <mc:AlternateContent xmlns:mc="http://schemas.openxmlformats.org/markup-compatibility/2006" xmlns:a14="http://schemas.microsoft.com/office/drawing/2010/main">
+        <mc:Choice Requires="a14">
           <p:sp>
             <p:nvSpPr>
               <p:cNvPr id="20" name="TextBox 19">
@@ -14837,7 +14862,7 @@
             </p:txBody>
           </p:sp>
         </mc:Choice>
-        <mc:Fallback>
+        <mc:Fallback xmlns="">
           <p:sp>
             <p:nvSpPr>
               <p:cNvPr id="20" name="TextBox 19">
@@ -14882,8 +14907,8 @@
           </p:sp>
         </mc:Fallback>
       </mc:AlternateContent>
-      <mc:AlternateContent xmlns:mc="http://schemas.openxmlformats.org/markup-compatibility/2006">
-        <mc:Choice xmlns:a14="http://schemas.microsoft.com/office/drawing/2010/main" Requires="a14">
+      <mc:AlternateContent xmlns:mc="http://schemas.openxmlformats.org/markup-compatibility/2006" xmlns:a14="http://schemas.microsoft.com/office/drawing/2010/main">
+        <mc:Choice Requires="a14">
           <p:sp>
             <p:nvSpPr>
               <p:cNvPr id="28" name="TextBox 27">
@@ -14925,6 +14950,7 @@
                 </a:r>
               </a:p>
               <a:p>
+                <a:pPr/>
                 <a14:m>
                   <m:oMathPara xmlns:m="http://schemas.openxmlformats.org/officeDocument/2006/math">
                     <m:oMathParaPr>
@@ -15169,7 +15195,7 @@
             </p:txBody>
           </p:sp>
         </mc:Choice>
-        <mc:Fallback>
+        <mc:Fallback xmlns="">
           <p:sp>
             <p:nvSpPr>
               <p:cNvPr id="28" name="TextBox 27">
@@ -15221,10 +15247,10 @@
       </mc:AlternateContent>
       <p:pic>
         <p:nvPicPr>
-          <p:cNvPr id="4" name="Picture 3" descr="A close up of a mans face&#10;&#10;Description generated with high confidence">
+          <p:cNvPr id="5" name="Picture 4" descr="A close up of a mans face&#10;&#10;Description generated with high confidence">
             <a:extLst>
               <a:ext uri="{FF2B5EF4-FFF2-40B4-BE49-F238E27FC236}">
-                <a16:creationId xmlns:a16="http://schemas.microsoft.com/office/drawing/2014/main" id="{5B8A56B4-7CFA-4B4E-98E7-A919CA275DA1}"/>
+                <a16:creationId xmlns:a16="http://schemas.microsoft.com/office/drawing/2014/main" id="{8396FE64-FA01-4F31-8CBC-816E13FF99ED}"/>
               </a:ext>
             </a:extLst>
           </p:cNvPr>
@@ -15247,8 +15273,8 @@
         </p:blipFill>
         <p:spPr>
           <a:xfrm>
-            <a:off x="6096000" y="1431867"/>
-            <a:ext cx="5325687" cy="3994265"/>
+            <a:off x="5583382" y="1027906"/>
+            <a:ext cx="6096000" cy="4572000"/>
           </a:xfrm>
           <a:prstGeom prst="rect">
             <a:avLst/>
@@ -15274,6 +15300,1881 @@
 </file>
 
 <file path=ppt/slides/slide7.xml><?xml version="1.0" encoding="utf-8"?>
+<p:sld xmlns:a="http://schemas.openxmlformats.org/drawingml/2006/main" xmlns:r="http://schemas.openxmlformats.org/officeDocument/2006/relationships" xmlns:p="http://schemas.openxmlformats.org/presentationml/2006/main">
+  <p:cSld>
+    <p:spTree>
+      <p:nvGrpSpPr>
+        <p:cNvPr id="1" name=""/>
+        <p:cNvGrpSpPr/>
+        <p:nvPr/>
+      </p:nvGrpSpPr>
+      <p:grpSpPr>
+        <a:xfrm>
+          <a:off x="0" y="0"/>
+          <a:ext cx="0" cy="0"/>
+          <a:chOff x="0" y="0"/>
+          <a:chExt cx="0" cy="0"/>
+        </a:xfrm>
+      </p:grpSpPr>
+      <p:sp>
+        <p:nvSpPr>
+          <p:cNvPr id="2" name="Title 1">
+            <a:extLst>
+              <a:ext uri="{FF2B5EF4-FFF2-40B4-BE49-F238E27FC236}">
+                <a16:creationId xmlns:a16="http://schemas.microsoft.com/office/drawing/2014/main" id="{EB59D587-CEFC-4935-937D-85FB1C5F1122}"/>
+              </a:ext>
+            </a:extLst>
+          </p:cNvPr>
+          <p:cNvSpPr>
+            <a:spLocks noGrp="1"/>
+          </p:cNvSpPr>
+          <p:nvPr>
+            <p:ph type="title"/>
+          </p:nvPr>
+        </p:nvSpPr>
+        <p:spPr>
+          <a:xfrm>
+            <a:off x="838200" y="365125"/>
+            <a:ext cx="10515600" cy="1325563"/>
+          </a:xfrm>
+        </p:spPr>
+        <p:txBody>
+          <a:bodyPr/>
+          <a:lstStyle/>
+          <a:p>
+            <a:r>
+              <a:rPr lang="en-US" dirty="0"/>
+              <a:t> Cooperator and Cheater </a:t>
+            </a:r>
+          </a:p>
+        </p:txBody>
+      </p:sp>
+      <mc:AlternateContent xmlns:mc="http://schemas.openxmlformats.org/markup-compatibility/2006">
+        <mc:Choice xmlns:a14="http://schemas.microsoft.com/office/drawing/2010/main" Requires="a14">
+          <p:sp>
+            <p:nvSpPr>
+              <p:cNvPr id="13" name="TextBox 12">
+                <a:extLst>
+                  <a:ext uri="{FF2B5EF4-FFF2-40B4-BE49-F238E27FC236}">
+                    <a16:creationId xmlns:a16="http://schemas.microsoft.com/office/drawing/2014/main" id="{6B94F657-6785-478A-B04B-B526BFF0837E}"/>
+                  </a:ext>
+                </a:extLst>
+              </p:cNvPr>
+              <p:cNvSpPr txBox="1"/>
+              <p:nvPr/>
+            </p:nvSpPr>
+            <p:spPr>
+              <a:xfrm>
+                <a:off x="1049553" y="1413689"/>
+                <a:ext cx="3365793" cy="276999"/>
+              </a:xfrm>
+              <a:prstGeom prst="rect">
+                <a:avLst/>
+              </a:prstGeom>
+              <a:noFill/>
+            </p:spPr>
+            <p:txBody>
+              <a:bodyPr wrap="none" lIns="0" tIns="0" rIns="0" bIns="0" rtlCol="0" anchor="b">
+                <a:spAutoFit/>
+              </a:bodyPr>
+              <a:lstStyle/>
+              <a:p>
+                <a:pPr/>
+                <a14:m>
+                  <m:oMathPara xmlns:m="http://schemas.openxmlformats.org/officeDocument/2006/math">
+                    <m:oMathParaPr>
+                      <m:jc m:val="centerGroup"/>
+                    </m:oMathParaPr>
+                    <m:oMath xmlns:m="http://schemas.openxmlformats.org/officeDocument/2006/math">
+                      <m:acc>
+                        <m:accPr>
+                          <m:chr m:val="̇"/>
+                          <m:ctrlPr>
+                            <a:rPr lang="en-US" b="0" i="1" smtClean="0">
+                              <a:solidFill>
+                                <a:srgbClr val="7030A0"/>
+                              </a:solidFill>
+                              <a:latin typeface="Cambria Math" panose="02040503050406030204" pitchFamily="18" charset="0"/>
+                            </a:rPr>
+                          </m:ctrlPr>
+                        </m:accPr>
+                        <m:e>
+                          <m:r>
+                            <a:rPr lang="en-US" b="0" i="1" smtClean="0">
+                              <a:solidFill>
+                                <a:srgbClr val="7030A0"/>
+                              </a:solidFill>
+                              <a:latin typeface="Cambria Math" panose="02040503050406030204" pitchFamily="18" charset="0"/>
+                            </a:rPr>
+                            <m:t>𝑠</m:t>
+                          </m:r>
+                        </m:e>
+                      </m:acc>
+                      <m:r>
+                        <a:rPr lang="en-US" b="0" i="1" smtClean="0">
+                          <a:latin typeface="Cambria Math" panose="02040503050406030204" pitchFamily="18" charset="0"/>
+                        </a:rPr>
+                        <m:t>=</m:t>
+                      </m:r>
+                      <m:r>
+                        <a:rPr lang="en-US" b="0" i="1" smtClean="0">
+                          <a:solidFill>
+                            <a:schemeClr val="tx1"/>
+                          </a:solidFill>
+                          <a:latin typeface="Cambria Math" panose="02040503050406030204" pitchFamily="18" charset="0"/>
+                        </a:rPr>
+                        <m:t>𝑑</m:t>
+                      </m:r>
+                      <m:d>
+                        <m:dPr>
+                          <m:ctrlPr>
+                            <a:rPr lang="en-US" b="0" i="1" smtClean="0">
+                              <a:solidFill>
+                                <a:schemeClr val="tx1"/>
+                              </a:solidFill>
+                              <a:latin typeface="Cambria Math" panose="02040503050406030204" pitchFamily="18" charset="0"/>
+                            </a:rPr>
+                          </m:ctrlPr>
+                        </m:dPr>
+                        <m:e>
+                          <m:sSup>
+                            <m:sSupPr>
+                              <m:ctrlPr>
+                                <a:rPr lang="en-US" b="0" i="1" smtClean="0">
+                                  <a:solidFill>
+                                    <a:schemeClr val="tx1"/>
+                                  </a:solidFill>
+                                  <a:latin typeface="Cambria Math" panose="02040503050406030204" pitchFamily="18" charset="0"/>
+                                </a:rPr>
+                              </m:ctrlPr>
+                            </m:sSupPr>
+                            <m:e>
+                              <m:r>
+                                <a:rPr lang="en-US" b="0" i="1" smtClean="0">
+                                  <a:solidFill>
+                                    <a:schemeClr val="tx1"/>
+                                  </a:solidFill>
+                                  <a:latin typeface="Cambria Math" panose="02040503050406030204" pitchFamily="18" charset="0"/>
+                                </a:rPr>
+                                <m:t>𝑠</m:t>
+                              </m:r>
+                            </m:e>
+                            <m:sup>
+                              <m:r>
+                                <a:rPr lang="en-US" b="0" i="1" smtClean="0">
+                                  <a:solidFill>
+                                    <a:schemeClr val="tx1"/>
+                                  </a:solidFill>
+                                  <a:latin typeface="Cambria Math" panose="02040503050406030204" pitchFamily="18" charset="0"/>
+                                </a:rPr>
+                                <m:t>0</m:t>
+                              </m:r>
+                            </m:sup>
+                          </m:sSup>
+                          <m:r>
+                            <a:rPr lang="en-US" b="0" i="1" smtClean="0">
+                              <a:solidFill>
+                                <a:schemeClr val="tx1"/>
+                              </a:solidFill>
+                              <a:latin typeface="Cambria Math" panose="02040503050406030204" pitchFamily="18" charset="0"/>
+                            </a:rPr>
+                            <m:t>−</m:t>
+                          </m:r>
+                          <m:r>
+                            <a:rPr lang="en-US" b="0" i="1" smtClean="0">
+                              <a:solidFill>
+                                <a:schemeClr val="tx1"/>
+                              </a:solidFill>
+                              <a:latin typeface="Cambria Math" panose="02040503050406030204" pitchFamily="18" charset="0"/>
+                            </a:rPr>
+                            <m:t>𝑠</m:t>
+                          </m:r>
+                        </m:e>
+                      </m:d>
+                      <m:r>
+                        <a:rPr lang="en-US" b="0" i="1" smtClean="0">
+                          <a:solidFill>
+                            <a:schemeClr val="tx1"/>
+                          </a:solidFill>
+                          <a:latin typeface="Cambria Math" panose="02040503050406030204" pitchFamily="18" charset="0"/>
+                        </a:rPr>
+                        <m:t>−</m:t>
+                      </m:r>
+                      <m:d>
+                        <m:dPr>
+                          <m:ctrlPr>
+                            <a:rPr lang="en-US" b="0" i="1" smtClean="0">
+                              <a:solidFill>
+                                <a:schemeClr val="tx1"/>
+                              </a:solidFill>
+                              <a:latin typeface="Cambria Math" panose="02040503050406030204" pitchFamily="18" charset="0"/>
+                            </a:rPr>
+                          </m:ctrlPr>
+                        </m:dPr>
+                        <m:e>
+                          <m:sSub>
+                            <m:sSubPr>
+                              <m:ctrlPr>
+                                <a:rPr lang="en-US" b="0" i="1" smtClean="0">
+                                  <a:solidFill>
+                                    <a:schemeClr val="tx1"/>
+                                  </a:solidFill>
+                                  <a:latin typeface="Cambria Math" panose="02040503050406030204" pitchFamily="18" charset="0"/>
+                                </a:rPr>
+                              </m:ctrlPr>
+                            </m:sSubPr>
+                            <m:e>
+                              <m:r>
+                                <a:rPr lang="en-US" b="0" i="1" smtClean="0">
+                                  <a:solidFill>
+                                    <a:schemeClr val="tx1"/>
+                                  </a:solidFill>
+                                  <a:latin typeface="Cambria Math" panose="02040503050406030204" pitchFamily="18" charset="0"/>
+                                </a:rPr>
+                                <m:t>𝑥</m:t>
+                              </m:r>
+                            </m:e>
+                            <m:sub>
+                              <m:r>
+                                <a:rPr lang="en-US" b="0" i="1" smtClean="0">
+                                  <a:solidFill>
+                                    <a:schemeClr val="tx1"/>
+                                  </a:solidFill>
+                                  <a:latin typeface="Cambria Math" panose="02040503050406030204" pitchFamily="18" charset="0"/>
+                                </a:rPr>
+                                <m:t>1</m:t>
+                              </m:r>
+                            </m:sub>
+                          </m:sSub>
+                          <m:r>
+                            <a:rPr lang="en-US" b="0" i="1" smtClean="0">
+                              <a:solidFill>
+                                <a:schemeClr val="tx1"/>
+                              </a:solidFill>
+                              <a:latin typeface="Cambria Math" panose="02040503050406030204" pitchFamily="18" charset="0"/>
+                            </a:rPr>
+                            <m:t>+</m:t>
+                          </m:r>
+                          <m:sSub>
+                            <m:sSubPr>
+                              <m:ctrlPr>
+                                <a:rPr lang="en-US" b="0" i="1" smtClean="0">
+                                  <a:solidFill>
+                                    <a:schemeClr val="tx1"/>
+                                  </a:solidFill>
+                                  <a:latin typeface="Cambria Math" panose="02040503050406030204" pitchFamily="18" charset="0"/>
+                                </a:rPr>
+                              </m:ctrlPr>
+                            </m:sSubPr>
+                            <m:e>
+                              <m:r>
+                                <a:rPr lang="en-US" b="0" i="1" smtClean="0">
+                                  <a:solidFill>
+                                    <a:schemeClr val="tx1"/>
+                                  </a:solidFill>
+                                  <a:latin typeface="Cambria Math" panose="02040503050406030204" pitchFamily="18" charset="0"/>
+                                </a:rPr>
+                                <m:t>𝑥</m:t>
+                              </m:r>
+                            </m:e>
+                            <m:sub>
+                              <m:r>
+                                <a:rPr lang="en-US" b="0" i="1" smtClean="0">
+                                  <a:solidFill>
+                                    <a:schemeClr val="tx1"/>
+                                  </a:solidFill>
+                                  <a:latin typeface="Cambria Math" panose="02040503050406030204" pitchFamily="18" charset="0"/>
+                                </a:rPr>
+                                <m:t>3</m:t>
+                              </m:r>
+                            </m:sub>
+                          </m:sSub>
+                        </m:e>
+                      </m:d>
+                      <m:r>
+                        <a:rPr lang="en-US" b="0" i="1" smtClean="0">
+                          <a:solidFill>
+                            <a:schemeClr val="tx1"/>
+                          </a:solidFill>
+                          <a:latin typeface="Cambria Math" panose="02040503050406030204" pitchFamily="18" charset="0"/>
+                        </a:rPr>
+                        <m:t>𝑓</m:t>
+                      </m:r>
+                      <m:d>
+                        <m:dPr>
+                          <m:ctrlPr>
+                            <a:rPr lang="en-US" b="0" i="1" smtClean="0">
+                              <a:solidFill>
+                                <a:schemeClr val="tx1"/>
+                              </a:solidFill>
+                              <a:latin typeface="Cambria Math" panose="02040503050406030204" pitchFamily="18" charset="0"/>
+                            </a:rPr>
+                          </m:ctrlPr>
+                        </m:dPr>
+                        <m:e>
+                          <m:r>
+                            <a:rPr lang="en-US" b="0" i="1" smtClean="0">
+                              <a:solidFill>
+                                <a:schemeClr val="tx1"/>
+                              </a:solidFill>
+                              <a:latin typeface="Cambria Math" panose="02040503050406030204" pitchFamily="18" charset="0"/>
+                            </a:rPr>
+                            <m:t>𝑠</m:t>
+                          </m:r>
+                          <m:r>
+                            <a:rPr lang="en-US" b="0" i="1" smtClean="0">
+                              <a:solidFill>
+                                <a:schemeClr val="tx1"/>
+                              </a:solidFill>
+                              <a:latin typeface="Cambria Math" panose="02040503050406030204" pitchFamily="18" charset="0"/>
+                            </a:rPr>
+                            <m:t>,</m:t>
+                          </m:r>
+                          <m:r>
+                            <a:rPr lang="en-US" b="0" i="1" smtClean="0">
+                              <a:solidFill>
+                                <a:schemeClr val="tx1"/>
+                              </a:solidFill>
+                              <a:latin typeface="Cambria Math" panose="02040503050406030204" pitchFamily="18" charset="0"/>
+                            </a:rPr>
+                            <m:t>𝑒</m:t>
+                          </m:r>
+                        </m:e>
+                      </m:d>
+                      <m:r>
+                        <a:rPr lang="en-US" b="0" i="1" smtClean="0">
+                          <a:solidFill>
+                            <a:schemeClr val="tx1"/>
+                          </a:solidFill>
+                          <a:latin typeface="Cambria Math" panose="02040503050406030204" pitchFamily="18" charset="0"/>
+                        </a:rPr>
+                        <m:t> </m:t>
+                      </m:r>
+                    </m:oMath>
+                  </m:oMathPara>
+                </a14:m>
+                <a:endParaRPr lang="en-US" dirty="0"/>
+              </a:p>
+            </p:txBody>
+          </p:sp>
+        </mc:Choice>
+        <mc:Fallback>
+          <p:sp>
+            <p:nvSpPr>
+              <p:cNvPr id="13" name="TextBox 12">
+                <a:extLst>
+                  <a:ext uri="{FF2B5EF4-FFF2-40B4-BE49-F238E27FC236}">
+                    <a16:creationId xmlns:a16="http://schemas.microsoft.com/office/drawing/2014/main" id="{6B94F657-6785-478A-B04B-B526BFF0837E}"/>
+                  </a:ext>
+                </a:extLst>
+              </p:cNvPr>
+              <p:cNvSpPr txBox="1">
+                <a:spLocks noRot="1" noChangeAspect="1" noMove="1" noResize="1" noEditPoints="1" noAdjustHandles="1" noChangeArrowheads="1" noChangeShapeType="1" noTextEdit="1"/>
+              </p:cNvSpPr>
+              <p:nvPr/>
+            </p:nvSpPr>
+            <p:spPr>
+              <a:xfrm>
+                <a:off x="1049553" y="1413689"/>
+                <a:ext cx="3365793" cy="276999"/>
+              </a:xfrm>
+              <a:prstGeom prst="rect">
+                <a:avLst/>
+              </a:prstGeom>
+              <a:blipFill>
+                <a:blip r:embed="rId2"/>
+                <a:stretch>
+                  <a:fillRect t="-4444" b="-35556"/>
+                </a:stretch>
+              </a:blipFill>
+            </p:spPr>
+            <p:txBody>
+              <a:bodyPr/>
+              <a:lstStyle/>
+              <a:p>
+                <a:r>
+                  <a:rPr lang="en-US">
+                    <a:noFill/>
+                  </a:rPr>
+                  <a:t> </a:t>
+                </a:r>
+              </a:p>
+            </p:txBody>
+          </p:sp>
+        </mc:Fallback>
+      </mc:AlternateContent>
+      <mc:AlternateContent xmlns:mc="http://schemas.openxmlformats.org/markup-compatibility/2006">
+        <mc:Choice xmlns:a14="http://schemas.microsoft.com/office/drawing/2010/main" Requires="a14">
+          <p:sp>
+            <p:nvSpPr>
+              <p:cNvPr id="15" name="TextBox 14">
+                <a:extLst>
+                  <a:ext uri="{FF2B5EF4-FFF2-40B4-BE49-F238E27FC236}">
+                    <a16:creationId xmlns:a16="http://schemas.microsoft.com/office/drawing/2014/main" id="{F950802A-DFC3-4211-89A3-E4277272EEAF}"/>
+                  </a:ext>
+                </a:extLst>
+              </p:cNvPr>
+              <p:cNvSpPr txBox="1"/>
+              <p:nvPr/>
+            </p:nvSpPr>
+            <p:spPr>
+              <a:xfrm>
+                <a:off x="1075694" y="1770632"/>
+                <a:ext cx="2089867" cy="276999"/>
+              </a:xfrm>
+              <a:prstGeom prst="rect">
+                <a:avLst/>
+              </a:prstGeom>
+              <a:noFill/>
+            </p:spPr>
+            <p:txBody>
+              <a:bodyPr wrap="none" lIns="0" tIns="0" rIns="0" bIns="0" rtlCol="0" anchor="b">
+                <a:spAutoFit/>
+              </a:bodyPr>
+              <a:lstStyle/>
+              <a:p>
+                <a14:m>
+                  <m:oMath xmlns:m="http://schemas.openxmlformats.org/officeDocument/2006/math">
+                    <m:acc>
+                      <m:accPr>
+                        <m:chr m:val="̇"/>
+                        <m:ctrlPr>
+                          <a:rPr lang="en-US" b="0" i="1" smtClean="0">
+                            <a:latin typeface="Cambria Math" panose="02040503050406030204" pitchFamily="18" charset="0"/>
+                          </a:rPr>
+                        </m:ctrlPr>
+                      </m:accPr>
+                      <m:e>
+                        <m:r>
+                          <a:rPr lang="en-US" b="0" i="1" smtClean="0">
+                            <a:solidFill>
+                              <a:srgbClr val="00B050"/>
+                            </a:solidFill>
+                            <a:latin typeface="Cambria Math" panose="02040503050406030204" pitchFamily="18" charset="0"/>
+                          </a:rPr>
+                          <m:t>𝑒</m:t>
+                        </m:r>
+                      </m:e>
+                    </m:acc>
+                    <m:r>
+                      <a:rPr lang="en-US" b="0" i="1" smtClean="0">
+                        <a:latin typeface="Cambria Math" panose="02040503050406030204" pitchFamily="18" charset="0"/>
+                      </a:rPr>
+                      <m:t>=</m:t>
+                    </m:r>
+                    <m:sSub>
+                      <m:sSubPr>
+                        <m:ctrlPr>
+                          <a:rPr lang="en-US" b="0" i="1" smtClean="0">
+                            <a:latin typeface="Cambria Math" panose="02040503050406030204" pitchFamily="18" charset="0"/>
+                          </a:rPr>
+                        </m:ctrlPr>
+                      </m:sSubPr>
+                      <m:e>
+                        <m:sSub>
+                          <m:sSubPr>
+                            <m:ctrlPr>
+                              <a:rPr lang="en-US" b="0" i="1" smtClean="0">
+                                <a:latin typeface="Cambria Math" panose="02040503050406030204" pitchFamily="18" charset="0"/>
+                              </a:rPr>
+                            </m:ctrlPr>
+                          </m:sSubPr>
+                          <m:e>
+                            <m:r>
+                              <a:rPr lang="en-US" b="0" i="1" smtClean="0">
+                                <a:latin typeface="Cambria Math" panose="02040503050406030204" pitchFamily="18" charset="0"/>
+                              </a:rPr>
+                              <m:t>𝑞</m:t>
+                            </m:r>
+                          </m:e>
+                          <m:sub>
+                            <m:r>
+                              <a:rPr lang="en-US" b="0" i="1" smtClean="0">
+                                <a:latin typeface="Cambria Math" panose="02040503050406030204" pitchFamily="18" charset="0"/>
+                              </a:rPr>
+                              <m:t>1</m:t>
+                            </m:r>
+                          </m:sub>
+                        </m:sSub>
+                        <m:r>
+                          <a:rPr lang="en-US" b="0" i="1" smtClean="0">
+                            <a:latin typeface="Cambria Math" panose="02040503050406030204" pitchFamily="18" charset="0"/>
+                          </a:rPr>
+                          <m:t>𝑥</m:t>
+                        </m:r>
+                      </m:e>
+                      <m:sub>
+                        <m:r>
+                          <a:rPr lang="en-US" b="0" i="1" smtClean="0">
+                            <a:latin typeface="Cambria Math" panose="02040503050406030204" pitchFamily="18" charset="0"/>
+                          </a:rPr>
+                          <m:t>1</m:t>
+                        </m:r>
+                      </m:sub>
+                    </m:sSub>
+                    <m:r>
+                      <a:rPr lang="en-US" b="0" i="1" smtClean="0">
+                        <a:latin typeface="Cambria Math" panose="02040503050406030204" pitchFamily="18" charset="0"/>
+                      </a:rPr>
+                      <m:t>𝑓</m:t>
+                    </m:r>
+                    <m:r>
+                      <a:rPr lang="en-US" b="0" i="1" smtClean="0">
+                        <a:latin typeface="Cambria Math" panose="02040503050406030204" pitchFamily="18" charset="0"/>
+                      </a:rPr>
+                      <m:t>(</m:t>
+                    </m:r>
+                    <m:r>
+                      <a:rPr lang="en-US" b="0" i="1" smtClean="0">
+                        <a:latin typeface="Cambria Math" panose="02040503050406030204" pitchFamily="18" charset="0"/>
+                      </a:rPr>
+                      <m:t>𝑠</m:t>
+                    </m:r>
+                    <m:r>
+                      <a:rPr lang="en-US" b="0" i="1" smtClean="0">
+                        <a:latin typeface="Cambria Math" panose="02040503050406030204" pitchFamily="18" charset="0"/>
+                      </a:rPr>
+                      <m:t>,</m:t>
+                    </m:r>
+                    <m:r>
+                      <a:rPr lang="en-US" b="0" i="1" smtClean="0">
+                        <a:latin typeface="Cambria Math" panose="02040503050406030204" pitchFamily="18" charset="0"/>
+                      </a:rPr>
+                      <m:t>𝑒</m:t>
+                    </m:r>
+                    <m:r>
+                      <a:rPr lang="en-US" b="0" i="1" smtClean="0">
+                        <a:latin typeface="Cambria Math" panose="02040503050406030204" pitchFamily="18" charset="0"/>
+                      </a:rPr>
+                      <m:t>)−</m:t>
+                    </m:r>
+                    <m:r>
+                      <a:rPr lang="en-US" b="0" i="1" smtClean="0">
+                        <a:solidFill>
+                          <a:schemeClr val="tx1"/>
+                        </a:solidFill>
+                        <a:latin typeface="Cambria Math" panose="02040503050406030204" pitchFamily="18" charset="0"/>
+                      </a:rPr>
+                      <m:t>𝑑𝑒</m:t>
+                    </m:r>
+                  </m:oMath>
+                </a14:m>
+                <a:r>
+                  <a:rPr lang="en-US" dirty="0">
+                    <a:solidFill>
+                      <a:schemeClr val="tx1"/>
+                    </a:solidFill>
+                  </a:rPr>
+                  <a:t> </a:t>
+                </a:r>
+                <a:endParaRPr lang="en-US" dirty="0"/>
+              </a:p>
+            </p:txBody>
+          </p:sp>
+        </mc:Choice>
+        <mc:Fallback>
+          <p:sp>
+            <p:nvSpPr>
+              <p:cNvPr id="15" name="TextBox 14">
+                <a:extLst>
+                  <a:ext uri="{FF2B5EF4-FFF2-40B4-BE49-F238E27FC236}">
+                    <a16:creationId xmlns:a16="http://schemas.microsoft.com/office/drawing/2014/main" id="{F950802A-DFC3-4211-89A3-E4277272EEAF}"/>
+                  </a:ext>
+                </a:extLst>
+              </p:cNvPr>
+              <p:cNvSpPr txBox="1">
+                <a:spLocks noRot="1" noChangeAspect="1" noMove="1" noResize="1" noEditPoints="1" noAdjustHandles="1" noChangeArrowheads="1" noChangeShapeType="1" noTextEdit="1"/>
+              </p:cNvSpPr>
+              <p:nvPr/>
+            </p:nvSpPr>
+            <p:spPr>
+              <a:xfrm>
+                <a:off x="1075694" y="1770632"/>
+                <a:ext cx="2089867" cy="276999"/>
+              </a:xfrm>
+              <a:prstGeom prst="rect">
+                <a:avLst/>
+              </a:prstGeom>
+              <a:blipFill>
+                <a:blip r:embed="rId3"/>
+                <a:stretch>
+                  <a:fillRect l="-2915" t="-2174" r="-583" b="-34783"/>
+                </a:stretch>
+              </a:blipFill>
+            </p:spPr>
+            <p:txBody>
+              <a:bodyPr/>
+              <a:lstStyle/>
+              <a:p>
+                <a:r>
+                  <a:rPr lang="en-US">
+                    <a:noFill/>
+                  </a:rPr>
+                  <a:t> </a:t>
+                </a:r>
+              </a:p>
+            </p:txBody>
+          </p:sp>
+        </mc:Fallback>
+      </mc:AlternateContent>
+      <mc:AlternateContent xmlns:mc="http://schemas.openxmlformats.org/markup-compatibility/2006">
+        <mc:Choice xmlns:a14="http://schemas.microsoft.com/office/drawing/2010/main" Requires="a14">
+          <p:sp>
+            <p:nvSpPr>
+              <p:cNvPr id="16" name="TextBox 15">
+                <a:extLst>
+                  <a:ext uri="{FF2B5EF4-FFF2-40B4-BE49-F238E27FC236}">
+                    <a16:creationId xmlns:a16="http://schemas.microsoft.com/office/drawing/2014/main" id="{E796595B-F1C0-4A49-9CC7-35C5D5914FF8}"/>
+                  </a:ext>
+                </a:extLst>
+              </p:cNvPr>
+              <p:cNvSpPr txBox="1"/>
+              <p:nvPr/>
+            </p:nvSpPr>
+            <p:spPr>
+              <a:xfrm>
+                <a:off x="1075694" y="2130119"/>
+                <a:ext cx="1356205" cy="276999"/>
+              </a:xfrm>
+              <a:prstGeom prst="rect">
+                <a:avLst/>
+              </a:prstGeom>
+              <a:noFill/>
+            </p:spPr>
+            <p:txBody>
+              <a:bodyPr wrap="none" lIns="0" tIns="0" rIns="0" bIns="0" rtlCol="0" anchor="b">
+                <a:spAutoFit/>
+              </a:bodyPr>
+              <a:lstStyle/>
+              <a:p>
+                <a:pPr/>
+                <a14:m>
+                  <m:oMathPara xmlns:m="http://schemas.openxmlformats.org/officeDocument/2006/math">
+                    <m:oMathParaPr>
+                      <m:jc m:val="centerGroup"/>
+                    </m:oMathParaPr>
+                    <m:oMath xmlns:m="http://schemas.openxmlformats.org/officeDocument/2006/math">
+                      <m:acc>
+                        <m:accPr>
+                          <m:chr m:val="̇"/>
+                          <m:ctrlPr>
+                            <a:rPr lang="en-US" b="0" i="1" smtClean="0">
+                              <a:latin typeface="Cambria Math" panose="02040503050406030204" pitchFamily="18" charset="0"/>
+                            </a:rPr>
+                          </m:ctrlPr>
+                        </m:accPr>
+                        <m:e>
+                          <m:r>
+                            <a:rPr lang="en-US" b="0" i="1" smtClean="0">
+                              <a:solidFill>
+                                <a:schemeClr val="accent2"/>
+                              </a:solidFill>
+                              <a:latin typeface="Cambria Math" panose="02040503050406030204" pitchFamily="18" charset="0"/>
+                            </a:rPr>
+                            <m:t>𝑡</m:t>
+                          </m:r>
+                        </m:e>
+                      </m:acc>
+                      <m:r>
+                        <a:rPr lang="en-US" b="0" i="1" smtClean="0">
+                          <a:latin typeface="Cambria Math" panose="02040503050406030204" pitchFamily="18" charset="0"/>
+                        </a:rPr>
+                        <m:t>=</m:t>
+                      </m:r>
+                      <m:r>
+                        <a:rPr lang="en-US" b="0" i="1" smtClean="0">
+                          <a:solidFill>
+                            <a:schemeClr val="tx1"/>
+                          </a:solidFill>
+                          <a:latin typeface="Cambria Math" panose="02040503050406030204" pitchFamily="18" charset="0"/>
+                        </a:rPr>
+                        <m:t>−</m:t>
+                      </m:r>
+                      <m:r>
+                        <a:rPr lang="en-US" b="0" i="1" smtClean="0">
+                          <a:solidFill>
+                            <a:schemeClr val="tx1"/>
+                          </a:solidFill>
+                          <a:latin typeface="Cambria Math" panose="02040503050406030204" pitchFamily="18" charset="0"/>
+                        </a:rPr>
+                        <m:t>𝑑𝑡</m:t>
+                      </m:r>
+                      <m:r>
+                        <a:rPr lang="en-US" b="0" i="1" smtClean="0">
+                          <a:solidFill>
+                            <a:schemeClr val="tx1"/>
+                          </a:solidFill>
+                          <a:latin typeface="Cambria Math" panose="02040503050406030204" pitchFamily="18" charset="0"/>
+                        </a:rPr>
+                        <m:t>→0</m:t>
+                      </m:r>
+                      <m:r>
+                        <a:rPr lang="en-US" b="0" i="1" smtClean="0">
+                          <a:solidFill>
+                            <a:schemeClr val="tx1"/>
+                          </a:solidFill>
+                          <a:latin typeface="Cambria Math" panose="02040503050406030204" pitchFamily="18" charset="0"/>
+                        </a:rPr>
+                        <m:t> </m:t>
+                      </m:r>
+                    </m:oMath>
+                  </m:oMathPara>
+                </a14:m>
+                <a:endParaRPr lang="en-US" dirty="0"/>
+              </a:p>
+            </p:txBody>
+          </p:sp>
+        </mc:Choice>
+        <mc:Fallback>
+          <p:sp>
+            <p:nvSpPr>
+              <p:cNvPr id="16" name="TextBox 15">
+                <a:extLst>
+                  <a:ext uri="{FF2B5EF4-FFF2-40B4-BE49-F238E27FC236}">
+                    <a16:creationId xmlns:a16="http://schemas.microsoft.com/office/drawing/2014/main" id="{E796595B-F1C0-4A49-9CC7-35C5D5914FF8}"/>
+                  </a:ext>
+                </a:extLst>
+              </p:cNvPr>
+              <p:cNvSpPr txBox="1">
+                <a:spLocks noRot="1" noChangeAspect="1" noMove="1" noResize="1" noEditPoints="1" noAdjustHandles="1" noChangeArrowheads="1" noChangeShapeType="1" noTextEdit="1"/>
+              </p:cNvSpPr>
+              <p:nvPr/>
+            </p:nvSpPr>
+            <p:spPr>
+              <a:xfrm>
+                <a:off x="1075694" y="2130119"/>
+                <a:ext cx="1356205" cy="276999"/>
+              </a:xfrm>
+              <a:prstGeom prst="rect">
+                <a:avLst/>
+              </a:prstGeom>
+              <a:blipFill>
+                <a:blip r:embed="rId4"/>
+                <a:stretch>
+                  <a:fillRect l="-3139" t="-10870" b="-8696"/>
+                </a:stretch>
+              </a:blipFill>
+            </p:spPr>
+            <p:txBody>
+              <a:bodyPr/>
+              <a:lstStyle/>
+              <a:p>
+                <a:r>
+                  <a:rPr lang="en-US">
+                    <a:noFill/>
+                  </a:rPr>
+                  <a:t> </a:t>
+                </a:r>
+              </a:p>
+            </p:txBody>
+          </p:sp>
+        </mc:Fallback>
+      </mc:AlternateContent>
+      <mc:AlternateContent xmlns:mc="http://schemas.openxmlformats.org/markup-compatibility/2006">
+        <mc:Choice xmlns:a14="http://schemas.microsoft.com/office/drawing/2010/main" Requires="a14">
+          <p:sp>
+            <p:nvSpPr>
+              <p:cNvPr id="20" name="TextBox 19">
+                <a:extLst>
+                  <a:ext uri="{FF2B5EF4-FFF2-40B4-BE49-F238E27FC236}">
+                    <a16:creationId xmlns:a16="http://schemas.microsoft.com/office/drawing/2014/main" id="{C1F6F25C-586D-493C-BECF-01EDD98F1135}"/>
+                  </a:ext>
+                </a:extLst>
+              </p:cNvPr>
+              <p:cNvSpPr txBox="1"/>
+              <p:nvPr/>
+            </p:nvSpPr>
+            <p:spPr>
+              <a:xfrm>
+                <a:off x="1022272" y="2841875"/>
+                <a:ext cx="2062295" cy="276999"/>
+              </a:xfrm>
+              <a:prstGeom prst="rect">
+                <a:avLst/>
+              </a:prstGeom>
+              <a:noFill/>
+            </p:spPr>
+            <p:txBody>
+              <a:bodyPr wrap="none" lIns="0" tIns="0" rIns="0" bIns="0" rtlCol="0" anchor="b">
+                <a:spAutoFit/>
+              </a:bodyPr>
+              <a:lstStyle/>
+              <a:p>
+                <a:pPr/>
+                <a14:m>
+                  <m:oMathPara xmlns:m="http://schemas.openxmlformats.org/officeDocument/2006/math">
+                    <m:oMathParaPr>
+                      <m:jc m:val="centerGroup"/>
+                    </m:oMathParaPr>
+                    <m:oMath xmlns:m="http://schemas.openxmlformats.org/officeDocument/2006/math">
+                      <m:acc>
+                        <m:accPr>
+                          <m:chr m:val="̇"/>
+                          <m:ctrlPr>
+                            <a:rPr lang="en-US" b="0" i="1" smtClean="0">
+                              <a:latin typeface="Cambria Math" panose="02040503050406030204" pitchFamily="18" charset="0"/>
+                            </a:rPr>
+                          </m:ctrlPr>
+                        </m:accPr>
+                        <m:e>
+                          <m:sSub>
+                            <m:sSubPr>
+                              <m:ctrlPr>
+                                <a:rPr lang="en-US" b="0" i="1" smtClean="0">
+                                  <a:solidFill>
+                                    <a:srgbClr val="FF00FF"/>
+                                  </a:solidFill>
+                                  <a:latin typeface="Cambria Math" panose="02040503050406030204" pitchFamily="18" charset="0"/>
+                                </a:rPr>
+                              </m:ctrlPr>
+                            </m:sSubPr>
+                            <m:e>
+                              <m:r>
+                                <a:rPr lang="en-US" b="0" i="1" smtClean="0">
+                                  <a:solidFill>
+                                    <a:srgbClr val="FF00FF"/>
+                                  </a:solidFill>
+                                  <a:latin typeface="Cambria Math" panose="02040503050406030204" pitchFamily="18" charset="0"/>
+                                </a:rPr>
+                                <m:t>𝑥</m:t>
+                              </m:r>
+                            </m:e>
+                            <m:sub>
+                              <m:r>
+                                <a:rPr lang="en-US" b="0" i="1" smtClean="0">
+                                  <a:solidFill>
+                                    <a:srgbClr val="FF00FF"/>
+                                  </a:solidFill>
+                                  <a:latin typeface="Cambria Math" panose="02040503050406030204" pitchFamily="18" charset="0"/>
+                                </a:rPr>
+                                <m:t>3</m:t>
+                              </m:r>
+                            </m:sub>
+                          </m:sSub>
+                        </m:e>
+                      </m:acc>
+                      <m:r>
+                        <a:rPr lang="en-US" b="0" i="1" smtClean="0">
+                          <a:latin typeface="Cambria Math" panose="02040503050406030204" pitchFamily="18" charset="0"/>
+                        </a:rPr>
+                        <m:t>=</m:t>
+                      </m:r>
+                      <m:sSub>
+                        <m:sSubPr>
+                          <m:ctrlPr>
+                            <a:rPr lang="en-US" b="0" i="1" smtClean="0">
+                              <a:solidFill>
+                                <a:schemeClr val="tx1"/>
+                              </a:solidFill>
+                              <a:latin typeface="Cambria Math" panose="02040503050406030204" pitchFamily="18" charset="0"/>
+                            </a:rPr>
+                          </m:ctrlPr>
+                        </m:sSubPr>
+                        <m:e>
+                          <m:r>
+                            <a:rPr lang="en-US" b="0" i="1" smtClean="0">
+                              <a:solidFill>
+                                <a:schemeClr val="tx1"/>
+                              </a:solidFill>
+                              <a:latin typeface="Cambria Math" panose="02040503050406030204" pitchFamily="18" charset="0"/>
+                            </a:rPr>
+                            <m:t>𝑥</m:t>
+                          </m:r>
+                        </m:e>
+                        <m:sub>
+                          <m:r>
+                            <a:rPr lang="en-US" b="0" i="1" smtClean="0">
+                              <a:solidFill>
+                                <a:schemeClr val="tx1"/>
+                              </a:solidFill>
+                              <a:latin typeface="Cambria Math" panose="02040503050406030204" pitchFamily="18" charset="0"/>
+                            </a:rPr>
+                            <m:t>3</m:t>
+                          </m:r>
+                        </m:sub>
+                      </m:sSub>
+                      <m:r>
+                        <a:rPr lang="en-US" b="0" i="1" smtClean="0">
+                          <a:solidFill>
+                            <a:schemeClr val="tx1"/>
+                          </a:solidFill>
+                          <a:latin typeface="Cambria Math" panose="02040503050406030204" pitchFamily="18" charset="0"/>
+                        </a:rPr>
+                        <m:t>(</m:t>
+                      </m:r>
+                      <m:r>
+                        <a:rPr lang="en-US" b="0" i="1" smtClean="0">
+                          <a:solidFill>
+                            <a:schemeClr val="tx1"/>
+                          </a:solidFill>
+                          <a:latin typeface="Cambria Math" panose="02040503050406030204" pitchFamily="18" charset="0"/>
+                        </a:rPr>
+                        <m:t>𝑓</m:t>
+                      </m:r>
+                      <m:d>
+                        <m:dPr>
+                          <m:ctrlPr>
+                            <a:rPr lang="en-US" b="0" i="1" smtClean="0">
+                              <a:solidFill>
+                                <a:schemeClr val="tx1"/>
+                              </a:solidFill>
+                              <a:latin typeface="Cambria Math" panose="02040503050406030204" pitchFamily="18" charset="0"/>
+                            </a:rPr>
+                          </m:ctrlPr>
+                        </m:dPr>
+                        <m:e>
+                          <m:r>
+                            <a:rPr lang="en-US" b="0" i="1" smtClean="0">
+                              <a:solidFill>
+                                <a:schemeClr val="tx1"/>
+                              </a:solidFill>
+                              <a:latin typeface="Cambria Math" panose="02040503050406030204" pitchFamily="18" charset="0"/>
+                            </a:rPr>
+                            <m:t>𝑠</m:t>
+                          </m:r>
+                          <m:r>
+                            <a:rPr lang="en-US" b="0" i="1" smtClean="0">
+                              <a:solidFill>
+                                <a:schemeClr val="tx1"/>
+                              </a:solidFill>
+                              <a:latin typeface="Cambria Math" panose="02040503050406030204" pitchFamily="18" charset="0"/>
+                            </a:rPr>
+                            <m:t>,</m:t>
+                          </m:r>
+                          <m:r>
+                            <a:rPr lang="en-US" b="0" i="1" smtClean="0">
+                              <a:solidFill>
+                                <a:schemeClr val="tx1"/>
+                              </a:solidFill>
+                              <a:latin typeface="Cambria Math" panose="02040503050406030204" pitchFamily="18" charset="0"/>
+                            </a:rPr>
+                            <m:t>𝑒</m:t>
+                          </m:r>
+                        </m:e>
+                      </m:d>
+                      <m:r>
+                        <a:rPr lang="en-US" b="0" i="1" smtClean="0">
+                          <a:solidFill>
+                            <a:schemeClr val="tx1"/>
+                          </a:solidFill>
+                          <a:latin typeface="Cambria Math" panose="02040503050406030204" pitchFamily="18" charset="0"/>
+                        </a:rPr>
+                        <m:t>−</m:t>
+                      </m:r>
+                      <m:r>
+                        <a:rPr lang="en-US" b="0" i="1" smtClean="0">
+                          <a:solidFill>
+                            <a:schemeClr val="tx1"/>
+                          </a:solidFill>
+                          <a:latin typeface="Cambria Math" panose="02040503050406030204" pitchFamily="18" charset="0"/>
+                        </a:rPr>
+                        <m:t>𝑑</m:t>
+                      </m:r>
+                      <m:r>
+                        <a:rPr lang="en-US" b="0" i="1" smtClean="0">
+                          <a:latin typeface="Cambria Math" panose="02040503050406030204" pitchFamily="18" charset="0"/>
+                        </a:rPr>
+                        <m:t>)</m:t>
+                      </m:r>
+                    </m:oMath>
+                  </m:oMathPara>
+                </a14:m>
+                <a:endParaRPr lang="en-US" dirty="0"/>
+              </a:p>
+            </p:txBody>
+          </p:sp>
+        </mc:Choice>
+        <mc:Fallback>
+          <p:sp>
+            <p:nvSpPr>
+              <p:cNvPr id="20" name="TextBox 19">
+                <a:extLst>
+                  <a:ext uri="{FF2B5EF4-FFF2-40B4-BE49-F238E27FC236}">
+                    <a16:creationId xmlns:a16="http://schemas.microsoft.com/office/drawing/2014/main" id="{C1F6F25C-586D-493C-BECF-01EDD98F1135}"/>
+                  </a:ext>
+                </a:extLst>
+              </p:cNvPr>
+              <p:cNvSpPr txBox="1">
+                <a:spLocks noRot="1" noChangeAspect="1" noMove="1" noResize="1" noEditPoints="1" noAdjustHandles="1" noChangeArrowheads="1" noChangeShapeType="1" noTextEdit="1"/>
+              </p:cNvSpPr>
+              <p:nvPr/>
+            </p:nvSpPr>
+            <p:spPr>
+              <a:xfrm>
+                <a:off x="1022272" y="2841875"/>
+                <a:ext cx="2062295" cy="276999"/>
+              </a:xfrm>
+              <a:prstGeom prst="rect">
+                <a:avLst/>
+              </a:prstGeom>
+              <a:blipFill>
+                <a:blip r:embed="rId5"/>
+                <a:stretch>
+                  <a:fillRect l="-1183" t="-2174" r="-3846" b="-34783"/>
+                </a:stretch>
+              </a:blipFill>
+            </p:spPr>
+            <p:txBody>
+              <a:bodyPr/>
+              <a:lstStyle/>
+              <a:p>
+                <a:r>
+                  <a:rPr lang="en-US">
+                    <a:noFill/>
+                  </a:rPr>
+                  <a:t> </a:t>
+                </a:r>
+              </a:p>
+            </p:txBody>
+          </p:sp>
+        </mc:Fallback>
+      </mc:AlternateContent>
+      <mc:AlternateContent xmlns:mc="http://schemas.openxmlformats.org/markup-compatibility/2006">
+        <mc:Choice xmlns:a14="http://schemas.microsoft.com/office/drawing/2010/main" Requires="a14">
+          <p:sp>
+            <p:nvSpPr>
+              <p:cNvPr id="28" name="TextBox 27">
+                <a:extLst>
+                  <a:ext uri="{FF2B5EF4-FFF2-40B4-BE49-F238E27FC236}">
+                    <a16:creationId xmlns:a16="http://schemas.microsoft.com/office/drawing/2014/main" id="{68C8C5A8-36E3-4D0D-9FDC-6402FDCBEF19}"/>
+                  </a:ext>
+                </a:extLst>
+              </p:cNvPr>
+              <p:cNvSpPr txBox="1"/>
+              <p:nvPr/>
+            </p:nvSpPr>
+            <p:spPr>
+              <a:xfrm>
+                <a:off x="897911" y="3595561"/>
+                <a:ext cx="2975430" cy="2234586"/>
+              </a:xfrm>
+              <a:prstGeom prst="rect">
+                <a:avLst/>
+              </a:prstGeom>
+              <a:noFill/>
+              <a:ln>
+                <a:solidFill>
+                  <a:schemeClr val="tx1"/>
+                </a:solidFill>
+              </a:ln>
+            </p:spPr>
+            <p:txBody>
+              <a:bodyPr wrap="square" lIns="0" tIns="0" rIns="0" bIns="0" rtlCol="0">
+                <a:spAutoFit/>
+              </a:bodyPr>
+              <a:lstStyle/>
+              <a:p>
+                <a:r>
+                  <a:rPr lang="en-US" b="0" dirty="0">
+                    <a:latin typeface="Cambria Math" panose="02040503050406030204" pitchFamily="18" charset="0"/>
+                  </a:rPr>
+                  <a:t> Analysis says: </a:t>
+                </a:r>
+              </a:p>
+              <a:p>
+                <a:pPr/>
+                <a:r>
+                  <a:rPr lang="en-US" dirty="0"/>
+                  <a:t>         </a:t>
+                </a:r>
+                <a:r>
+                  <a:rPr lang="en-US" b="0" dirty="0"/>
+                  <a:t>If </a:t>
+                </a:r>
+                <a14:m>
+                  <m:oMath xmlns:m="http://schemas.openxmlformats.org/officeDocument/2006/math">
+                    <m:sSub>
+                      <m:sSubPr>
+                        <m:ctrlPr>
+                          <a:rPr lang="en-US" b="0" i="1" smtClean="0">
+                            <a:latin typeface="Cambria Math" panose="02040503050406030204" pitchFamily="18" charset="0"/>
+                          </a:rPr>
+                        </m:ctrlPr>
+                      </m:sSubPr>
+                      <m:e>
+                        <m:r>
+                          <a:rPr lang="en-US" b="0" i="1" smtClean="0">
+                            <a:latin typeface="Cambria Math" panose="02040503050406030204" pitchFamily="18" charset="0"/>
+                          </a:rPr>
+                          <m:t>𝑥</m:t>
+                        </m:r>
+                      </m:e>
+                      <m:sub>
+                        <m:r>
+                          <a:rPr lang="en-US" b="0" i="1" smtClean="0">
+                            <a:latin typeface="Cambria Math" panose="02040503050406030204" pitchFamily="18" charset="0"/>
+                          </a:rPr>
+                          <m:t>1</m:t>
+                        </m:r>
+                      </m:sub>
+                    </m:sSub>
+                    <m:r>
+                      <a:rPr lang="en-US" b="0" i="1" smtClean="0">
+                        <a:latin typeface="Cambria Math" panose="02040503050406030204" pitchFamily="18" charset="0"/>
+                      </a:rPr>
+                      <m:t>, </m:t>
+                    </m:r>
+                    <m:sSub>
+                      <m:sSubPr>
+                        <m:ctrlPr>
+                          <a:rPr lang="en-US" b="0" i="1" smtClean="0">
+                            <a:latin typeface="Cambria Math" panose="02040503050406030204" pitchFamily="18" charset="0"/>
+                          </a:rPr>
+                        </m:ctrlPr>
+                      </m:sSubPr>
+                      <m:e>
+                        <m:r>
+                          <a:rPr lang="en-US" b="0" i="1" smtClean="0">
+                            <a:latin typeface="Cambria Math" panose="02040503050406030204" pitchFamily="18" charset="0"/>
+                          </a:rPr>
+                          <m:t>𝑥</m:t>
+                        </m:r>
+                      </m:e>
+                      <m:sub>
+                        <m:r>
+                          <a:rPr lang="en-US" b="0" i="1" smtClean="0">
+                            <a:latin typeface="Cambria Math" panose="02040503050406030204" pitchFamily="18" charset="0"/>
+                          </a:rPr>
+                          <m:t>3</m:t>
+                        </m:r>
+                      </m:sub>
+                    </m:sSub>
+                    <m:r>
+                      <a:rPr lang="en-US" b="0" i="1" smtClean="0">
+                        <a:latin typeface="Cambria Math" panose="02040503050406030204" pitchFamily="18" charset="0"/>
+                      </a:rPr>
+                      <m:t>&gt;0, </m:t>
+                    </m:r>
+                    <m:sSub>
+                      <m:sSubPr>
+                        <m:ctrlPr>
+                          <a:rPr lang="en-US" b="0" i="1" smtClean="0">
+                            <a:latin typeface="Cambria Math" panose="02040503050406030204" pitchFamily="18" charset="0"/>
+                          </a:rPr>
+                        </m:ctrlPr>
+                      </m:sSubPr>
+                      <m:e>
+                        <m:r>
+                          <a:rPr lang="en-US" b="0" i="1" smtClean="0">
+                            <a:latin typeface="Cambria Math" panose="02040503050406030204" pitchFamily="18" charset="0"/>
+                          </a:rPr>
+                          <m:t>𝑥</m:t>
+                        </m:r>
+                      </m:e>
+                      <m:sub>
+                        <m:r>
+                          <a:rPr lang="en-US" b="0" i="1" smtClean="0">
+                            <a:latin typeface="Cambria Math" panose="02040503050406030204" pitchFamily="18" charset="0"/>
+                          </a:rPr>
+                          <m:t>2</m:t>
+                        </m:r>
+                      </m:sub>
+                    </m:sSub>
+                    <m:r>
+                      <a:rPr lang="en-US" b="0" i="1" smtClean="0">
+                        <a:latin typeface="Cambria Math" panose="02040503050406030204" pitchFamily="18" charset="0"/>
+                      </a:rPr>
+                      <m:t>=0:</m:t>
+                    </m:r>
+                  </m:oMath>
+                </a14:m>
+                <a:br>
+                  <a:rPr lang="en-US" b="0" i="1" dirty="0">
+                    <a:latin typeface="Cambria Math" panose="02040503050406030204" pitchFamily="18" charset="0"/>
+                  </a:rPr>
+                </a:br>
+                <a:r>
+                  <a:rPr lang="en-US" b="0" i="1" dirty="0">
+                    <a:latin typeface="Cambria Math" panose="02040503050406030204" pitchFamily="18" charset="0"/>
+                  </a:rPr>
+                  <a:t>	</a:t>
+                </a:r>
+                <a:r>
+                  <a:rPr lang="en-US" b="0" dirty="0">
+                    <a:latin typeface="Cambria Math" panose="02040503050406030204" pitchFamily="18" charset="0"/>
+                  </a:rPr>
+                  <a:t>Requires </a:t>
+                </a:r>
+                <a:br>
+                  <a:rPr lang="en-US" b="0" dirty="0">
+                    <a:latin typeface="Cambria Math" panose="02040503050406030204" pitchFamily="18" charset="0"/>
+                  </a:rPr>
+                </a:br>
+                <a14:m>
+                  <m:oMathPara xmlns:m="http://schemas.openxmlformats.org/officeDocument/2006/math">
+                    <m:oMathParaPr>
+                      <m:jc m:val="centerGroup"/>
+                    </m:oMathParaPr>
+                    <m:oMath xmlns:m="http://schemas.openxmlformats.org/officeDocument/2006/math">
+                      <m:r>
+                        <a:rPr lang="en-US" b="0" i="1" smtClean="0">
+                          <a:latin typeface="Cambria Math" panose="02040503050406030204" pitchFamily="18" charset="0"/>
+                        </a:rPr>
+                        <m:t>𝑓</m:t>
+                      </m:r>
+                      <m:d>
+                        <m:dPr>
+                          <m:ctrlPr>
+                            <a:rPr lang="en-US" b="0" i="1" smtClean="0">
+                              <a:latin typeface="Cambria Math" panose="02040503050406030204" pitchFamily="18" charset="0"/>
+                            </a:rPr>
+                          </m:ctrlPr>
+                        </m:dPr>
+                        <m:e>
+                          <m:r>
+                            <a:rPr lang="en-US" b="0" i="1" smtClean="0">
+                              <a:latin typeface="Cambria Math" panose="02040503050406030204" pitchFamily="18" charset="0"/>
+                            </a:rPr>
+                            <m:t>𝑠</m:t>
+                          </m:r>
+                          <m:r>
+                            <a:rPr lang="en-US" b="0" i="1" smtClean="0">
+                              <a:latin typeface="Cambria Math" panose="02040503050406030204" pitchFamily="18" charset="0"/>
+                            </a:rPr>
+                            <m:t>,</m:t>
+                          </m:r>
+                          <m:r>
+                            <a:rPr lang="en-US" b="0" i="1" smtClean="0">
+                              <a:latin typeface="Cambria Math" panose="02040503050406030204" pitchFamily="18" charset="0"/>
+                            </a:rPr>
+                            <m:t>𝑒</m:t>
+                          </m:r>
+                        </m:e>
+                      </m:d>
+                      <m:r>
+                        <a:rPr lang="en-US" b="0" i="1" smtClean="0">
+                          <a:latin typeface="Cambria Math" panose="02040503050406030204" pitchFamily="18" charset="0"/>
+                        </a:rPr>
+                        <m:t>=</m:t>
+                      </m:r>
+                      <m:r>
+                        <a:rPr lang="en-US" b="0" i="1" smtClean="0">
+                          <a:latin typeface="Cambria Math" panose="02040503050406030204" pitchFamily="18" charset="0"/>
+                        </a:rPr>
+                        <m:t>𝑑</m:t>
+                      </m:r>
+                      <m:r>
+                        <a:rPr lang="en-US" b="0" i="1" smtClean="0">
+                          <a:latin typeface="Cambria Math" panose="02040503050406030204" pitchFamily="18" charset="0"/>
+                        </a:rPr>
+                        <m:t>=</m:t>
+                      </m:r>
+                      <m:f>
+                        <m:fPr>
+                          <m:ctrlPr>
+                            <a:rPr lang="en-US" b="0" i="1" smtClean="0">
+                              <a:latin typeface="Cambria Math" panose="02040503050406030204" pitchFamily="18" charset="0"/>
+                            </a:rPr>
+                          </m:ctrlPr>
+                        </m:fPr>
+                        <m:num>
+                          <m:r>
+                            <a:rPr lang="en-US" b="0" i="1" smtClean="0">
+                              <a:latin typeface="Cambria Math" panose="02040503050406030204" pitchFamily="18" charset="0"/>
+                            </a:rPr>
+                            <m:t>𝑑</m:t>
+                          </m:r>
+                        </m:num>
+                        <m:den>
+                          <m:r>
+                            <a:rPr lang="en-US" b="0" i="1" smtClean="0">
+                              <a:latin typeface="Cambria Math" panose="02040503050406030204" pitchFamily="18" charset="0"/>
+                            </a:rPr>
+                            <m:t>1−</m:t>
+                          </m:r>
+                          <m:sSub>
+                            <m:sSubPr>
+                              <m:ctrlPr>
+                                <a:rPr lang="en-US" b="0" i="1" smtClean="0">
+                                  <a:latin typeface="Cambria Math" panose="02040503050406030204" pitchFamily="18" charset="0"/>
+                                </a:rPr>
+                              </m:ctrlPr>
+                            </m:sSubPr>
+                            <m:e>
+                              <m:r>
+                                <a:rPr lang="en-US" b="0" i="1" smtClean="0">
+                                  <a:latin typeface="Cambria Math" panose="02040503050406030204" pitchFamily="18" charset="0"/>
+                                </a:rPr>
+                                <m:t>𝑞</m:t>
+                              </m:r>
+                            </m:e>
+                            <m:sub>
+                              <m:r>
+                                <a:rPr lang="en-US" b="0" i="1" smtClean="0">
+                                  <a:latin typeface="Cambria Math" panose="02040503050406030204" pitchFamily="18" charset="0"/>
+                                </a:rPr>
+                                <m:t>1</m:t>
+                              </m:r>
+                            </m:sub>
+                          </m:sSub>
+                        </m:den>
+                      </m:f>
+                    </m:oMath>
+                  </m:oMathPara>
+                </a14:m>
+                <a:endParaRPr lang="en-US" b="0" dirty="0">
+                  <a:latin typeface="Cambria Math" panose="02040503050406030204" pitchFamily="18" charset="0"/>
+                </a:endParaRPr>
+              </a:p>
+              <a:p>
+                <a:endParaRPr lang="en-US" dirty="0"/>
+              </a:p>
+              <a:p>
+                <a:r>
+                  <a:rPr lang="en-US" b="0" dirty="0"/>
+                  <a:t> Not possible for </a:t>
+                </a:r>
+                <a14:m>
+                  <m:oMath xmlns:m="http://schemas.openxmlformats.org/officeDocument/2006/math">
+                    <m:sSub>
+                      <m:sSubPr>
+                        <m:ctrlPr>
+                          <a:rPr lang="en-US" b="0" i="1" smtClean="0">
+                            <a:latin typeface="Cambria Math" panose="02040503050406030204" pitchFamily="18" charset="0"/>
+                          </a:rPr>
+                        </m:ctrlPr>
+                      </m:sSubPr>
+                      <m:e>
+                        <m:r>
+                          <a:rPr lang="en-US" b="0" i="1" smtClean="0">
+                            <a:latin typeface="Cambria Math" panose="02040503050406030204" pitchFamily="18" charset="0"/>
+                          </a:rPr>
+                          <m:t>𝑞</m:t>
+                        </m:r>
+                      </m:e>
+                      <m:sub>
+                        <m:r>
+                          <a:rPr lang="en-US" b="0" i="1" smtClean="0">
+                            <a:latin typeface="Cambria Math" panose="02040503050406030204" pitchFamily="18" charset="0"/>
+                          </a:rPr>
+                          <m:t>1</m:t>
+                        </m:r>
+                      </m:sub>
+                    </m:sSub>
+                    <m:r>
+                      <a:rPr lang="en-US" b="0" i="1" smtClean="0">
+                        <a:latin typeface="Cambria Math" panose="02040503050406030204" pitchFamily="18" charset="0"/>
+                      </a:rPr>
+                      <m:t>&gt;0</m:t>
+                    </m:r>
+                  </m:oMath>
+                </a14:m>
+                <a:r>
+                  <a:rPr lang="en-US" b="0" dirty="0"/>
+                  <a:t>. </a:t>
+                </a:r>
+              </a:p>
+              <a:p>
+                <a:r>
+                  <a:rPr lang="en-US" b="0" dirty="0"/>
+                  <a:t> Thus a tragedy should occur.</a:t>
+                </a:r>
+                <a:endParaRPr lang="en-US" dirty="0"/>
+              </a:p>
+            </p:txBody>
+          </p:sp>
+        </mc:Choice>
+        <mc:Fallback>
+          <p:sp>
+            <p:nvSpPr>
+              <p:cNvPr id="28" name="TextBox 27">
+                <a:extLst>
+                  <a:ext uri="{FF2B5EF4-FFF2-40B4-BE49-F238E27FC236}">
+                    <a16:creationId xmlns:a16="http://schemas.microsoft.com/office/drawing/2014/main" id="{68C8C5A8-36E3-4D0D-9FDC-6402FDCBEF19}"/>
+                  </a:ext>
+                </a:extLst>
+              </p:cNvPr>
+              <p:cNvSpPr txBox="1">
+                <a:spLocks noRot="1" noChangeAspect="1" noMove="1" noResize="1" noEditPoints="1" noAdjustHandles="1" noChangeArrowheads="1" noChangeShapeType="1" noTextEdit="1"/>
+              </p:cNvSpPr>
+              <p:nvPr/>
+            </p:nvSpPr>
+            <p:spPr>
+              <a:xfrm>
+                <a:off x="897911" y="3595561"/>
+                <a:ext cx="2975430" cy="2234586"/>
+              </a:xfrm>
+              <a:prstGeom prst="rect">
+                <a:avLst/>
+              </a:prstGeom>
+              <a:blipFill>
+                <a:blip r:embed="rId6"/>
+                <a:stretch>
+                  <a:fillRect l="-2857" t="-3533" b="-5163"/>
+                </a:stretch>
+              </a:blipFill>
+              <a:ln>
+                <a:solidFill>
+                  <a:schemeClr val="tx1"/>
+                </a:solidFill>
+              </a:ln>
+            </p:spPr>
+            <p:txBody>
+              <a:bodyPr/>
+              <a:lstStyle/>
+              <a:p>
+                <a:r>
+                  <a:rPr lang="en-US">
+                    <a:noFill/>
+                  </a:rPr>
+                  <a:t> </a:t>
+                </a:r>
+              </a:p>
+            </p:txBody>
+          </p:sp>
+        </mc:Fallback>
+      </mc:AlternateContent>
+      <mc:AlternateContent xmlns:mc="http://schemas.openxmlformats.org/markup-compatibility/2006">
+        <mc:Choice xmlns:a14="http://schemas.microsoft.com/office/drawing/2010/main" Requires="a14">
+          <p:sp>
+            <p:nvSpPr>
+              <p:cNvPr id="10" name="TextBox 9">
+                <a:extLst>
+                  <a:ext uri="{FF2B5EF4-FFF2-40B4-BE49-F238E27FC236}">
+                    <a16:creationId xmlns:a16="http://schemas.microsoft.com/office/drawing/2014/main" id="{7B480DDC-28FE-4542-A9BD-0A6EDD394256}"/>
+                  </a:ext>
+                </a:extLst>
+              </p:cNvPr>
+              <p:cNvSpPr txBox="1"/>
+              <p:nvPr/>
+            </p:nvSpPr>
+            <p:spPr>
+              <a:xfrm>
+                <a:off x="1049553" y="2517450"/>
+                <a:ext cx="2869760" cy="276999"/>
+              </a:xfrm>
+              <a:prstGeom prst="rect">
+                <a:avLst/>
+              </a:prstGeom>
+              <a:noFill/>
+            </p:spPr>
+            <p:txBody>
+              <a:bodyPr wrap="none" lIns="0" tIns="0" rIns="0" bIns="0" rtlCol="0" anchor="b">
+                <a:spAutoFit/>
+              </a:bodyPr>
+              <a:lstStyle/>
+              <a:p>
+                <a:pPr/>
+                <a14:m>
+                  <m:oMathPara xmlns:m="http://schemas.openxmlformats.org/officeDocument/2006/math">
+                    <m:oMathParaPr>
+                      <m:jc m:val="centerGroup"/>
+                    </m:oMathParaPr>
+                    <m:oMath xmlns:m="http://schemas.openxmlformats.org/officeDocument/2006/math">
+                      <m:acc>
+                        <m:accPr>
+                          <m:chr m:val="̇"/>
+                          <m:ctrlPr>
+                            <a:rPr lang="en-US" b="0" i="1" smtClean="0">
+                              <a:latin typeface="Cambria Math" panose="02040503050406030204" pitchFamily="18" charset="0"/>
+                            </a:rPr>
+                          </m:ctrlPr>
+                        </m:accPr>
+                        <m:e>
+                          <m:sSub>
+                            <m:sSubPr>
+                              <m:ctrlPr>
+                                <a:rPr lang="en-US" b="0" i="1" smtClean="0">
+                                  <a:solidFill>
+                                    <a:srgbClr val="FF0000"/>
+                                  </a:solidFill>
+                                  <a:latin typeface="Cambria Math" panose="02040503050406030204" pitchFamily="18" charset="0"/>
+                                </a:rPr>
+                              </m:ctrlPr>
+                            </m:sSubPr>
+                            <m:e>
+                              <m:r>
+                                <a:rPr lang="en-US" b="0" i="1" smtClean="0">
+                                  <a:solidFill>
+                                    <a:srgbClr val="FF0000"/>
+                                  </a:solidFill>
+                                  <a:latin typeface="Cambria Math" panose="02040503050406030204" pitchFamily="18" charset="0"/>
+                                </a:rPr>
+                                <m:t>𝑥</m:t>
+                              </m:r>
+                            </m:e>
+                            <m:sub>
+                              <m:r>
+                                <a:rPr lang="en-US" b="0" i="1" smtClean="0">
+                                  <a:solidFill>
+                                    <a:srgbClr val="FF0000"/>
+                                  </a:solidFill>
+                                  <a:latin typeface="Cambria Math" panose="02040503050406030204" pitchFamily="18" charset="0"/>
+                                </a:rPr>
+                                <m:t>1</m:t>
+                              </m:r>
+                            </m:sub>
+                          </m:sSub>
+                        </m:e>
+                      </m:acc>
+                      <m:r>
+                        <a:rPr lang="en-US" b="0" i="1" smtClean="0">
+                          <a:latin typeface="Cambria Math" panose="02040503050406030204" pitchFamily="18" charset="0"/>
+                        </a:rPr>
+                        <m:t>=</m:t>
+                      </m:r>
+                      <m:sSub>
+                        <m:sSubPr>
+                          <m:ctrlPr>
+                            <a:rPr lang="en-US" b="0" i="1" smtClean="0">
+                              <a:solidFill>
+                                <a:schemeClr val="tx1"/>
+                              </a:solidFill>
+                              <a:latin typeface="Cambria Math" panose="02040503050406030204" pitchFamily="18" charset="0"/>
+                            </a:rPr>
+                          </m:ctrlPr>
+                        </m:sSubPr>
+                        <m:e>
+                          <m:r>
+                            <a:rPr lang="en-US" b="0" i="1" smtClean="0">
+                              <a:solidFill>
+                                <a:schemeClr val="tx1"/>
+                              </a:solidFill>
+                              <a:latin typeface="Cambria Math" panose="02040503050406030204" pitchFamily="18" charset="0"/>
+                            </a:rPr>
+                            <m:t>𝑥</m:t>
+                          </m:r>
+                        </m:e>
+                        <m:sub>
+                          <m:r>
+                            <a:rPr lang="en-US" b="0" i="1" smtClean="0">
+                              <a:solidFill>
+                                <a:schemeClr val="tx1"/>
+                              </a:solidFill>
+                              <a:latin typeface="Cambria Math" panose="02040503050406030204" pitchFamily="18" charset="0"/>
+                            </a:rPr>
+                            <m:t>1</m:t>
+                          </m:r>
+                        </m:sub>
+                      </m:sSub>
+                      <m:r>
+                        <a:rPr lang="en-US" b="0" i="1" smtClean="0">
+                          <a:solidFill>
+                            <a:schemeClr val="tx1"/>
+                          </a:solidFill>
+                          <a:latin typeface="Cambria Math" panose="02040503050406030204" pitchFamily="18" charset="0"/>
+                        </a:rPr>
+                        <m:t>(</m:t>
+                      </m:r>
+                      <m:d>
+                        <m:dPr>
+                          <m:ctrlPr>
+                            <a:rPr lang="en-US" b="0" i="1" smtClean="0">
+                              <a:solidFill>
+                                <a:schemeClr val="tx1"/>
+                              </a:solidFill>
+                              <a:latin typeface="Cambria Math" panose="02040503050406030204" pitchFamily="18" charset="0"/>
+                            </a:rPr>
+                          </m:ctrlPr>
+                        </m:dPr>
+                        <m:e>
+                          <m:r>
+                            <a:rPr lang="en-US" b="0" i="1" smtClean="0">
+                              <a:solidFill>
+                                <a:schemeClr val="tx1"/>
+                              </a:solidFill>
+                              <a:latin typeface="Cambria Math" panose="02040503050406030204" pitchFamily="18" charset="0"/>
+                            </a:rPr>
+                            <m:t>1−</m:t>
+                          </m:r>
+                          <m:sSub>
+                            <m:sSubPr>
+                              <m:ctrlPr>
+                                <a:rPr lang="en-US" b="0" i="1" smtClean="0">
+                                  <a:solidFill>
+                                    <a:schemeClr val="tx1"/>
+                                  </a:solidFill>
+                                  <a:latin typeface="Cambria Math" panose="02040503050406030204" pitchFamily="18" charset="0"/>
+                                </a:rPr>
+                              </m:ctrlPr>
+                            </m:sSubPr>
+                            <m:e>
+                              <m:r>
+                                <a:rPr lang="en-US" b="0" i="1" smtClean="0">
+                                  <a:solidFill>
+                                    <a:schemeClr val="tx1"/>
+                                  </a:solidFill>
+                                  <a:latin typeface="Cambria Math" panose="02040503050406030204" pitchFamily="18" charset="0"/>
+                                </a:rPr>
+                                <m:t>𝑞</m:t>
+                              </m:r>
+                            </m:e>
+                            <m:sub>
+                              <m:r>
+                                <a:rPr lang="en-US" b="0" i="1" smtClean="0">
+                                  <a:solidFill>
+                                    <a:schemeClr val="tx1"/>
+                                  </a:solidFill>
+                                  <a:latin typeface="Cambria Math" panose="02040503050406030204" pitchFamily="18" charset="0"/>
+                                </a:rPr>
+                                <m:t>1</m:t>
+                              </m:r>
+                            </m:sub>
+                          </m:sSub>
+                        </m:e>
+                      </m:d>
+                      <m:r>
+                        <a:rPr lang="en-US" b="0" i="1" smtClean="0">
+                          <a:solidFill>
+                            <a:schemeClr val="tx1"/>
+                          </a:solidFill>
+                          <a:latin typeface="Cambria Math" panose="02040503050406030204" pitchFamily="18" charset="0"/>
+                        </a:rPr>
+                        <m:t>𝑓</m:t>
+                      </m:r>
+                      <m:d>
+                        <m:dPr>
+                          <m:ctrlPr>
+                            <a:rPr lang="en-US" b="0" i="1" smtClean="0">
+                              <a:solidFill>
+                                <a:schemeClr val="tx1"/>
+                              </a:solidFill>
+                              <a:latin typeface="Cambria Math" panose="02040503050406030204" pitchFamily="18" charset="0"/>
+                            </a:rPr>
+                          </m:ctrlPr>
+                        </m:dPr>
+                        <m:e>
+                          <m:r>
+                            <a:rPr lang="en-US" b="0" i="1" smtClean="0">
+                              <a:solidFill>
+                                <a:schemeClr val="tx1"/>
+                              </a:solidFill>
+                              <a:latin typeface="Cambria Math" panose="02040503050406030204" pitchFamily="18" charset="0"/>
+                            </a:rPr>
+                            <m:t>𝑠</m:t>
+                          </m:r>
+                          <m:r>
+                            <a:rPr lang="en-US" b="0" i="1" smtClean="0">
+                              <a:solidFill>
+                                <a:schemeClr val="tx1"/>
+                              </a:solidFill>
+                              <a:latin typeface="Cambria Math" panose="02040503050406030204" pitchFamily="18" charset="0"/>
+                            </a:rPr>
+                            <m:t>,</m:t>
+                          </m:r>
+                          <m:r>
+                            <a:rPr lang="en-US" b="0" i="1" smtClean="0">
+                              <a:solidFill>
+                                <a:schemeClr val="tx1"/>
+                              </a:solidFill>
+                              <a:latin typeface="Cambria Math" panose="02040503050406030204" pitchFamily="18" charset="0"/>
+                            </a:rPr>
+                            <m:t>𝑒</m:t>
+                          </m:r>
+                        </m:e>
+                      </m:d>
+                      <m:r>
+                        <a:rPr lang="en-US" b="0" i="1" smtClean="0">
+                          <a:solidFill>
+                            <a:schemeClr val="tx1"/>
+                          </a:solidFill>
+                          <a:latin typeface="Cambria Math" panose="02040503050406030204" pitchFamily="18" charset="0"/>
+                        </a:rPr>
+                        <m:t>−</m:t>
+                      </m:r>
+                      <m:r>
+                        <a:rPr lang="en-US" b="0" i="1" smtClean="0">
+                          <a:solidFill>
+                            <a:schemeClr val="tx1"/>
+                          </a:solidFill>
+                          <a:latin typeface="Cambria Math" panose="02040503050406030204" pitchFamily="18" charset="0"/>
+                        </a:rPr>
+                        <m:t>𝑑</m:t>
+                      </m:r>
+                      <m:r>
+                        <a:rPr lang="en-US" b="0" i="1" smtClean="0">
+                          <a:latin typeface="Cambria Math" panose="02040503050406030204" pitchFamily="18" charset="0"/>
+                        </a:rPr>
+                        <m:t>)</m:t>
+                      </m:r>
+                    </m:oMath>
+                  </m:oMathPara>
+                </a14:m>
+                <a:endParaRPr lang="en-US" dirty="0"/>
+              </a:p>
+            </p:txBody>
+          </p:sp>
+        </mc:Choice>
+        <mc:Fallback>
+          <p:sp>
+            <p:nvSpPr>
+              <p:cNvPr id="10" name="TextBox 9">
+                <a:extLst>
+                  <a:ext uri="{FF2B5EF4-FFF2-40B4-BE49-F238E27FC236}">
+                    <a16:creationId xmlns:a16="http://schemas.microsoft.com/office/drawing/2014/main" id="{7B480DDC-28FE-4542-A9BD-0A6EDD394256}"/>
+                  </a:ext>
+                </a:extLst>
+              </p:cNvPr>
+              <p:cNvSpPr txBox="1">
+                <a:spLocks noRot="1" noChangeAspect="1" noMove="1" noResize="1" noEditPoints="1" noAdjustHandles="1" noChangeArrowheads="1" noChangeShapeType="1" noTextEdit="1"/>
+              </p:cNvSpPr>
+              <p:nvPr/>
+            </p:nvSpPr>
+            <p:spPr>
+              <a:xfrm>
+                <a:off x="1049553" y="2517450"/>
+                <a:ext cx="2869760" cy="276999"/>
+              </a:xfrm>
+              <a:prstGeom prst="rect">
+                <a:avLst/>
+              </a:prstGeom>
+              <a:blipFill>
+                <a:blip r:embed="rId7"/>
+                <a:stretch>
+                  <a:fillRect l="-849" t="-2222" r="-2335" b="-35556"/>
+                </a:stretch>
+              </a:blipFill>
+            </p:spPr>
+            <p:txBody>
+              <a:bodyPr/>
+              <a:lstStyle/>
+              <a:p>
+                <a:r>
+                  <a:rPr lang="en-US">
+                    <a:noFill/>
+                  </a:rPr>
+                  <a:t> </a:t>
+                </a:r>
+              </a:p>
+            </p:txBody>
+          </p:sp>
+        </mc:Fallback>
+      </mc:AlternateContent>
+      <p:pic>
+        <p:nvPicPr>
+          <p:cNvPr id="5" name="Picture 4" descr="A close up of a map&#10;&#10;Description generated with high confidence">
+            <a:extLst>
+              <a:ext uri="{FF2B5EF4-FFF2-40B4-BE49-F238E27FC236}">
+                <a16:creationId xmlns:a16="http://schemas.microsoft.com/office/drawing/2014/main" id="{39AB4A8E-15F0-4E1D-9A40-1A959EE4A1C8}"/>
+              </a:ext>
+            </a:extLst>
+          </p:cNvPr>
+          <p:cNvPicPr>
+            <a:picLocks noChangeAspect="1"/>
+          </p:cNvPicPr>
+          <p:nvPr/>
+        </p:nvPicPr>
+        <p:blipFill>
+          <a:blip r:embed="rId8">
+            <a:extLst>
+              <a:ext uri="{28A0092B-C50C-407E-A947-70E740481C1C}">
+                <a14:useLocalDpi xmlns:a14="http://schemas.microsoft.com/office/drawing/2010/main" val="0"/>
+              </a:ext>
+            </a:extLst>
+          </a:blip>
+          <a:stretch>
+            <a:fillRect/>
+          </a:stretch>
+        </p:blipFill>
+        <p:spPr>
+          <a:xfrm>
+            <a:off x="5469153" y="1552188"/>
+            <a:ext cx="6096000" cy="4572000"/>
+          </a:xfrm>
+          <a:prstGeom prst="rect">
+            <a:avLst/>
+          </a:prstGeom>
+          <a:ln>
+            <a:solidFill>
+              <a:schemeClr val="tx1"/>
+            </a:solidFill>
+          </a:ln>
+        </p:spPr>
+      </p:pic>
+    </p:spTree>
+    <p:extLst>
+      <p:ext uri="{BB962C8B-B14F-4D97-AF65-F5344CB8AC3E}">
+        <p14:creationId xmlns:p14="http://schemas.microsoft.com/office/powerpoint/2010/main" val="4043290015"/>
+      </p:ext>
+    </p:extLst>
+  </p:cSld>
+  <p:clrMapOvr>
+    <a:masterClrMapping/>
+  </p:clrMapOvr>
+</p:sld>
+</file>
+
+<file path=ppt/slides/slide8.xml><?xml version="1.0" encoding="utf-8"?>
+<p:sld xmlns:a="http://schemas.openxmlformats.org/drawingml/2006/main" xmlns:r="http://schemas.openxmlformats.org/officeDocument/2006/relationships" xmlns:p="http://schemas.openxmlformats.org/presentationml/2006/main">
+  <p:cSld>
+    <p:spTree>
+      <p:nvGrpSpPr>
+        <p:cNvPr id="1" name=""/>
+        <p:cNvGrpSpPr/>
+        <p:nvPr/>
+      </p:nvGrpSpPr>
+      <p:grpSpPr>
+        <a:xfrm>
+          <a:off x="0" y="0"/>
+          <a:ext cx="0" cy="0"/>
+          <a:chOff x="0" y="0"/>
+          <a:chExt cx="0" cy="0"/>
+        </a:xfrm>
+      </p:grpSpPr>
+      <p:sp>
+        <p:nvSpPr>
+          <p:cNvPr id="2" name="Title 1">
+            <a:extLst>
+              <a:ext uri="{FF2B5EF4-FFF2-40B4-BE49-F238E27FC236}">
+                <a16:creationId xmlns:a16="http://schemas.microsoft.com/office/drawing/2014/main" id="{5BFF8061-4011-47F7-9E01-0917F4B01B7B}"/>
+              </a:ext>
+            </a:extLst>
+          </p:cNvPr>
+          <p:cNvSpPr>
+            <a:spLocks noGrp="1"/>
+          </p:cNvSpPr>
+          <p:nvPr>
+            <p:ph type="title"/>
+          </p:nvPr>
+        </p:nvSpPr>
+        <p:spPr/>
+        <p:txBody>
+          <a:bodyPr/>
+          <a:lstStyle/>
+          <a:p>
+            <a:endParaRPr lang="en-US"/>
+          </a:p>
+        </p:txBody>
+      </p:sp>
+      <p:sp>
+        <p:nvSpPr>
+          <p:cNvPr id="3" name="Content Placeholder 2">
+            <a:extLst>
+              <a:ext uri="{FF2B5EF4-FFF2-40B4-BE49-F238E27FC236}">
+                <a16:creationId xmlns:a16="http://schemas.microsoft.com/office/drawing/2014/main" id="{8FE6A46B-D922-4E09-AA47-BA00D0F7D75F}"/>
+              </a:ext>
+            </a:extLst>
+          </p:cNvPr>
+          <p:cNvSpPr>
+            <a:spLocks noGrp="1"/>
+          </p:cNvSpPr>
+          <p:nvPr>
+            <p:ph idx="1"/>
+          </p:nvPr>
+        </p:nvSpPr>
+        <p:spPr/>
+        <p:txBody>
+          <a:bodyPr/>
+          <a:lstStyle/>
+          <a:p>
+            <a:endParaRPr lang="en-US"/>
+          </a:p>
+        </p:txBody>
+      </p:sp>
+    </p:spTree>
+    <p:extLst>
+      <p:ext uri="{BB962C8B-B14F-4D97-AF65-F5344CB8AC3E}">
+        <p14:creationId xmlns:p14="http://schemas.microsoft.com/office/powerpoint/2010/main" val="3531423447"/>
+      </p:ext>
+    </p:extLst>
+  </p:cSld>
+  <p:clrMapOvr>
+    <a:masterClrMapping/>
+  </p:clrMapOvr>
+</p:sld>
+</file>
+
+<file path=ppt/slides/slide9.xml><?xml version="1.0" encoding="utf-8"?>
 <p:sld xmlns:a="http://schemas.openxmlformats.org/drawingml/2006/main" xmlns:r="http://schemas.openxmlformats.org/officeDocument/2006/relationships" xmlns:p="http://schemas.openxmlformats.org/presentationml/2006/main">
   <p:cSld>
     <p:spTree>

</xml_diff>